<commit_message>
0.9.9: improved appoinement system
</commit_message>
<xml_diff>
--- a/roadmap.pptx
+++ b/roadmap.pptx
@@ -6,6 +6,9 @@
   </p:sldMasterIdLst>
   <p:sldIdLst>
     <p:sldId id="256" r:id="rId2"/>
+    <p:sldId id="258" r:id="rId3"/>
+    <p:sldId id="259" r:id="rId4"/>
+    <p:sldId id="260" r:id="rId5"/>
   </p:sldIdLst>
   <p:sldSz cx="12192000" cy="6858000"/>
   <p:notesSz cx="6858000" cy="9144000"/>
@@ -259,7 +262,7 @@
           <a:p>
             <a:fld id="{90745D86-D533-4367-BAD3-8E674D1E8289}" type="datetimeFigureOut">
               <a:rPr lang="ko-KR" altLang="en-US" smtClean="0"/>
-              <a:t>2025-01-11</a:t>
+              <a:t>2025-01-27</a:t>
             </a:fld>
             <a:endParaRPr lang="ko-KR" altLang="en-US"/>
           </a:p>
@@ -457,7 +460,7 @@
           <a:p>
             <a:fld id="{90745D86-D533-4367-BAD3-8E674D1E8289}" type="datetimeFigureOut">
               <a:rPr lang="ko-KR" altLang="en-US" smtClean="0"/>
-              <a:t>2025-01-11</a:t>
+              <a:t>2025-01-27</a:t>
             </a:fld>
             <a:endParaRPr lang="ko-KR" altLang="en-US"/>
           </a:p>
@@ -665,7 +668,7 @@
           <a:p>
             <a:fld id="{90745D86-D533-4367-BAD3-8E674D1E8289}" type="datetimeFigureOut">
               <a:rPr lang="ko-KR" altLang="en-US" smtClean="0"/>
-              <a:t>2025-01-11</a:t>
+              <a:t>2025-01-27</a:t>
             </a:fld>
             <a:endParaRPr lang="ko-KR" altLang="en-US"/>
           </a:p>
@@ -863,7 +866,7 @@
           <a:p>
             <a:fld id="{90745D86-D533-4367-BAD3-8E674D1E8289}" type="datetimeFigureOut">
               <a:rPr lang="ko-KR" altLang="en-US" smtClean="0"/>
-              <a:t>2025-01-11</a:t>
+              <a:t>2025-01-27</a:t>
             </a:fld>
             <a:endParaRPr lang="ko-KR" altLang="en-US"/>
           </a:p>
@@ -1138,7 +1141,7 @@
           <a:p>
             <a:fld id="{90745D86-D533-4367-BAD3-8E674D1E8289}" type="datetimeFigureOut">
               <a:rPr lang="ko-KR" altLang="en-US" smtClean="0"/>
-              <a:t>2025-01-11</a:t>
+              <a:t>2025-01-27</a:t>
             </a:fld>
             <a:endParaRPr lang="ko-KR" altLang="en-US"/>
           </a:p>
@@ -1403,7 +1406,7 @@
           <a:p>
             <a:fld id="{90745D86-D533-4367-BAD3-8E674D1E8289}" type="datetimeFigureOut">
               <a:rPr lang="ko-KR" altLang="en-US" smtClean="0"/>
-              <a:t>2025-01-11</a:t>
+              <a:t>2025-01-27</a:t>
             </a:fld>
             <a:endParaRPr lang="ko-KR" altLang="en-US"/>
           </a:p>
@@ -1815,7 +1818,7 @@
           <a:p>
             <a:fld id="{90745D86-D533-4367-BAD3-8E674D1E8289}" type="datetimeFigureOut">
               <a:rPr lang="ko-KR" altLang="en-US" smtClean="0"/>
-              <a:t>2025-01-11</a:t>
+              <a:t>2025-01-27</a:t>
             </a:fld>
             <a:endParaRPr lang="ko-KR" altLang="en-US"/>
           </a:p>
@@ -1956,7 +1959,7 @@
           <a:p>
             <a:fld id="{90745D86-D533-4367-BAD3-8E674D1E8289}" type="datetimeFigureOut">
               <a:rPr lang="ko-KR" altLang="en-US" smtClean="0"/>
-              <a:t>2025-01-11</a:t>
+              <a:t>2025-01-27</a:t>
             </a:fld>
             <a:endParaRPr lang="ko-KR" altLang="en-US"/>
           </a:p>
@@ -2069,7 +2072,7 @@
           <a:p>
             <a:fld id="{90745D86-D533-4367-BAD3-8E674D1E8289}" type="datetimeFigureOut">
               <a:rPr lang="ko-KR" altLang="en-US" smtClean="0"/>
-              <a:t>2025-01-11</a:t>
+              <a:t>2025-01-27</a:t>
             </a:fld>
             <a:endParaRPr lang="ko-KR" altLang="en-US"/>
           </a:p>
@@ -2380,7 +2383,7 @@
           <a:p>
             <a:fld id="{90745D86-D533-4367-BAD3-8E674D1E8289}" type="datetimeFigureOut">
               <a:rPr lang="ko-KR" altLang="en-US" smtClean="0"/>
-              <a:t>2025-01-11</a:t>
+              <a:t>2025-01-27</a:t>
             </a:fld>
             <a:endParaRPr lang="ko-KR" altLang="en-US"/>
           </a:p>
@@ -2668,7 +2671,7 @@
           <a:p>
             <a:fld id="{90745D86-D533-4367-BAD3-8E674D1E8289}" type="datetimeFigureOut">
               <a:rPr lang="ko-KR" altLang="en-US" smtClean="0"/>
-              <a:t>2025-01-11</a:t>
+              <a:t>2025-01-27</a:t>
             </a:fld>
             <a:endParaRPr lang="ko-KR" altLang="en-US"/>
           </a:p>
@@ -2909,7 +2912,7 @@
           <a:p>
             <a:fld id="{90745D86-D533-4367-BAD3-8E674D1E8289}" type="datetimeFigureOut">
               <a:rPr lang="ko-KR" altLang="en-US" smtClean="0"/>
-              <a:t>2025-01-11</a:t>
+              <a:t>2025-01-27</a:t>
             </a:fld>
             <a:endParaRPr lang="ko-KR" altLang="en-US"/>
           </a:p>
@@ -4604,6 +4607,1664 @@
 </p:sld>
 </file>
 
+<file path=ppt/slides/slide2.xml><?xml version="1.0" encoding="utf-8"?>
+<p:sld xmlns:a="http://schemas.openxmlformats.org/drawingml/2006/main" xmlns:r="http://schemas.openxmlformats.org/officeDocument/2006/relationships" xmlns:p="http://schemas.openxmlformats.org/presentationml/2006/main">
+  <p:cSld>
+    <p:spTree>
+      <p:nvGrpSpPr>
+        <p:cNvPr id="1" name="">
+          <a:extLst>
+            <a:ext uri="{FF2B5EF4-FFF2-40B4-BE49-F238E27FC236}">
+              <a16:creationId xmlns:a16="http://schemas.microsoft.com/office/drawing/2014/main" id="{63B48141-A849-1D02-8F30-FADC558EA8E9}"/>
+            </a:ext>
+          </a:extLst>
+        </p:cNvPr>
+        <p:cNvGrpSpPr/>
+        <p:nvPr/>
+      </p:nvGrpSpPr>
+      <p:grpSpPr>
+        <a:xfrm>
+          <a:off x="0" y="0"/>
+          <a:ext cx="0" cy="0"/>
+          <a:chOff x="0" y="0"/>
+          <a:chExt cx="0" cy="0"/>
+        </a:xfrm>
+      </p:grpSpPr>
+      <p:graphicFrame>
+        <p:nvGraphicFramePr>
+          <p:cNvPr id="4" name="표 3">
+            <a:extLst>
+              <a:ext uri="{FF2B5EF4-FFF2-40B4-BE49-F238E27FC236}">
+                <a16:creationId xmlns:a16="http://schemas.microsoft.com/office/drawing/2014/main" id="{384C50E9-0F7D-FF1E-7D55-765DC91B397D}"/>
+              </a:ext>
+            </a:extLst>
+          </p:cNvPr>
+          <p:cNvGraphicFramePr>
+            <a:graphicFrameLocks noGrp="1"/>
+          </p:cNvGraphicFramePr>
+          <p:nvPr>
+            <p:extLst>
+              <p:ext uri="{D42A27DB-BD31-4B8C-83A1-F6EECF244321}">
+                <p14:modId xmlns:p14="http://schemas.microsoft.com/office/powerpoint/2010/main" val="4284745543"/>
+              </p:ext>
+            </p:extLst>
+          </p:nvPr>
+        </p:nvGraphicFramePr>
+        <p:xfrm>
+          <a:off x="3657600" y="418315"/>
+          <a:ext cx="8534400" cy="6021370"/>
+        </p:xfrm>
+        <a:graphic>
+          <a:graphicData uri="http://schemas.openxmlformats.org/drawingml/2006/table">
+            <a:tbl>
+              <a:tblPr firstRow="1" bandRow="1">
+                <a:tableStyleId>{00A15C55-8517-42AA-B614-E9B94910E393}</a:tableStyleId>
+              </a:tblPr>
+              <a:tblGrid>
+                <a:gridCol w="1219200">
+                  <a:extLst>
+                    <a:ext uri="{9D8B030D-6E8A-4147-A177-3AD203B41FA5}">
+                      <a16:colId xmlns:a16="http://schemas.microsoft.com/office/drawing/2014/main" val="1302412510"/>
+                    </a:ext>
+                  </a:extLst>
+                </a:gridCol>
+                <a:gridCol w="1219200">
+                  <a:extLst>
+                    <a:ext uri="{9D8B030D-6E8A-4147-A177-3AD203B41FA5}">
+                      <a16:colId xmlns:a16="http://schemas.microsoft.com/office/drawing/2014/main" val="2646398293"/>
+                    </a:ext>
+                  </a:extLst>
+                </a:gridCol>
+                <a:gridCol w="1219200">
+                  <a:extLst>
+                    <a:ext uri="{9D8B030D-6E8A-4147-A177-3AD203B41FA5}">
+                      <a16:colId xmlns:a16="http://schemas.microsoft.com/office/drawing/2014/main" val="2569636540"/>
+                    </a:ext>
+                  </a:extLst>
+                </a:gridCol>
+                <a:gridCol w="1219200">
+                  <a:extLst>
+                    <a:ext uri="{9D8B030D-6E8A-4147-A177-3AD203B41FA5}">
+                      <a16:colId xmlns:a16="http://schemas.microsoft.com/office/drawing/2014/main" val="3274953365"/>
+                    </a:ext>
+                  </a:extLst>
+                </a:gridCol>
+                <a:gridCol w="1219200">
+                  <a:extLst>
+                    <a:ext uri="{9D8B030D-6E8A-4147-A177-3AD203B41FA5}">
+                      <a16:colId xmlns:a16="http://schemas.microsoft.com/office/drawing/2014/main" val="1392578749"/>
+                    </a:ext>
+                  </a:extLst>
+                </a:gridCol>
+                <a:gridCol w="1219200">
+                  <a:extLst>
+                    <a:ext uri="{9D8B030D-6E8A-4147-A177-3AD203B41FA5}">
+                      <a16:colId xmlns:a16="http://schemas.microsoft.com/office/drawing/2014/main" val="2681730240"/>
+                    </a:ext>
+                  </a:extLst>
+                </a:gridCol>
+                <a:gridCol w="1219200">
+                  <a:extLst>
+                    <a:ext uri="{9D8B030D-6E8A-4147-A177-3AD203B41FA5}">
+                      <a16:colId xmlns:a16="http://schemas.microsoft.com/office/drawing/2014/main" val="4042025131"/>
+                    </a:ext>
+                  </a:extLst>
+                </a:gridCol>
+              </a:tblGrid>
+              <a:tr h="1204274">
+                <a:tc>
+                  <a:txBody>
+                    <a:bodyPr/>
+                    <a:lstStyle/>
+                    <a:p>
+                      <a:pPr algn="ctr" latinLnBrk="1"/>
+                      <a:r>
+                        <a:rPr lang="ko-KR" altLang="en-US" dirty="0"/>
+                        <a:t>주차</a:t>
+                      </a:r>
+                    </a:p>
+                  </a:txBody>
+                  <a:tcPr anchor="ctr"/>
+                </a:tc>
+                <a:tc>
+                  <a:txBody>
+                    <a:bodyPr/>
+                    <a:lstStyle/>
+                    <a:p>
+                      <a:pPr marL="0" marR="0" lvl="0" indent="0" algn="ctr" defTabSz="914400" rtl="0" eaLnBrk="1" fontAlgn="auto" latinLnBrk="1" hangingPunct="1">
+                        <a:lnSpc>
+                          <a:spcPct val="100000"/>
+                        </a:lnSpc>
+                        <a:spcBef>
+                          <a:spcPts val="0"/>
+                        </a:spcBef>
+                        <a:spcAft>
+                          <a:spcPts val="0"/>
+                        </a:spcAft>
+                        <a:buClrTx/>
+                        <a:buSzTx/>
+                        <a:buFontTx/>
+                        <a:buNone/>
+                        <a:tabLst/>
+                        <a:defRPr/>
+                      </a:pPr>
+                      <a:r>
+                        <a:rPr lang="en-US" altLang="ko-KR" dirty="0"/>
+                        <a:t>4</a:t>
+                      </a:r>
+                      <a:br>
+                        <a:rPr lang="en-US" altLang="ko-KR" dirty="0"/>
+                      </a:br>
+                      <a:r>
+                        <a:rPr lang="en-US" altLang="ko-KR" dirty="0"/>
+                        <a:t>(27~2)</a:t>
+                      </a:r>
+                      <a:endParaRPr lang="ko-KR" altLang="en-US" dirty="0"/>
+                    </a:p>
+                  </a:txBody>
+                  <a:tcPr anchor="ctr"/>
+                </a:tc>
+                <a:tc>
+                  <a:txBody>
+                    <a:bodyPr/>
+                    <a:lstStyle/>
+                    <a:p>
+                      <a:pPr marL="0" marR="0" lvl="0" indent="0" algn="ctr" defTabSz="914400" rtl="0" eaLnBrk="1" fontAlgn="auto" latinLnBrk="1" hangingPunct="1">
+                        <a:lnSpc>
+                          <a:spcPct val="100000"/>
+                        </a:lnSpc>
+                        <a:spcBef>
+                          <a:spcPts val="0"/>
+                        </a:spcBef>
+                        <a:spcAft>
+                          <a:spcPts val="0"/>
+                        </a:spcAft>
+                        <a:buClrTx/>
+                        <a:buSzTx/>
+                        <a:buFontTx/>
+                        <a:buNone/>
+                        <a:tabLst/>
+                        <a:defRPr/>
+                      </a:pPr>
+                      <a:r>
+                        <a:rPr lang="en-US" altLang="ko-KR" dirty="0"/>
+                        <a:t>5</a:t>
+                      </a:r>
+                      <a:br>
+                        <a:rPr lang="en-US" altLang="ko-KR" dirty="0"/>
+                      </a:br>
+                      <a:r>
+                        <a:rPr lang="en-US" altLang="ko-KR" dirty="0"/>
+                        <a:t>(3~9)</a:t>
+                      </a:r>
+                      <a:endParaRPr lang="ko-KR" altLang="en-US" dirty="0"/>
+                    </a:p>
+                  </a:txBody>
+                  <a:tcPr anchor="ctr"/>
+                </a:tc>
+                <a:tc>
+                  <a:txBody>
+                    <a:bodyPr/>
+                    <a:lstStyle/>
+                    <a:p>
+                      <a:pPr marL="0" marR="0" lvl="0" indent="0" algn="ctr" defTabSz="914400" rtl="0" eaLnBrk="1" fontAlgn="auto" latinLnBrk="1" hangingPunct="1">
+                        <a:lnSpc>
+                          <a:spcPct val="100000"/>
+                        </a:lnSpc>
+                        <a:spcBef>
+                          <a:spcPts val="0"/>
+                        </a:spcBef>
+                        <a:spcAft>
+                          <a:spcPts val="0"/>
+                        </a:spcAft>
+                        <a:buClrTx/>
+                        <a:buSzTx/>
+                        <a:buFontTx/>
+                        <a:buNone/>
+                        <a:tabLst/>
+                        <a:defRPr/>
+                      </a:pPr>
+                      <a:r>
+                        <a:rPr lang="en-US" altLang="ko-KR" dirty="0"/>
+                        <a:t>6</a:t>
+                      </a:r>
+                      <a:br>
+                        <a:rPr lang="en-US" altLang="ko-KR" dirty="0"/>
+                      </a:br>
+                      <a:r>
+                        <a:rPr lang="en-US" altLang="ko-KR" dirty="0"/>
+                        <a:t>(10~16)</a:t>
+                      </a:r>
+                      <a:endParaRPr lang="ko-KR" altLang="en-US" dirty="0"/>
+                    </a:p>
+                  </a:txBody>
+                  <a:tcPr anchor="ctr"/>
+                </a:tc>
+                <a:tc>
+                  <a:txBody>
+                    <a:bodyPr/>
+                    <a:lstStyle/>
+                    <a:p>
+                      <a:pPr marL="0" marR="0" lvl="0" indent="0" algn="ctr" defTabSz="914400" rtl="0" eaLnBrk="1" fontAlgn="auto" latinLnBrk="1" hangingPunct="1">
+                        <a:lnSpc>
+                          <a:spcPct val="100000"/>
+                        </a:lnSpc>
+                        <a:spcBef>
+                          <a:spcPts val="0"/>
+                        </a:spcBef>
+                        <a:spcAft>
+                          <a:spcPts val="0"/>
+                        </a:spcAft>
+                        <a:buClrTx/>
+                        <a:buSzTx/>
+                        <a:buFontTx/>
+                        <a:buNone/>
+                        <a:tabLst/>
+                        <a:defRPr/>
+                      </a:pPr>
+                      <a:r>
+                        <a:rPr lang="en-US" altLang="ko-KR" dirty="0"/>
+                        <a:t>7</a:t>
+                      </a:r>
+                      <a:br>
+                        <a:rPr lang="en-US" altLang="ko-KR" dirty="0"/>
+                      </a:br>
+                      <a:r>
+                        <a:rPr lang="en-US" altLang="ko-KR" dirty="0"/>
+                        <a:t>(17~23)</a:t>
+                      </a:r>
+                      <a:endParaRPr lang="ko-KR" altLang="en-US" dirty="0"/>
+                    </a:p>
+                  </a:txBody>
+                  <a:tcPr anchor="ctr"/>
+                </a:tc>
+                <a:tc>
+                  <a:txBody>
+                    <a:bodyPr/>
+                    <a:lstStyle/>
+                    <a:p>
+                      <a:pPr marL="0" marR="0" lvl="0" indent="0" algn="ctr" defTabSz="914400" rtl="0" eaLnBrk="1" fontAlgn="auto" latinLnBrk="1" hangingPunct="1">
+                        <a:lnSpc>
+                          <a:spcPct val="100000"/>
+                        </a:lnSpc>
+                        <a:spcBef>
+                          <a:spcPts val="0"/>
+                        </a:spcBef>
+                        <a:spcAft>
+                          <a:spcPts val="0"/>
+                        </a:spcAft>
+                        <a:buClrTx/>
+                        <a:buSzTx/>
+                        <a:buFontTx/>
+                        <a:buNone/>
+                        <a:tabLst/>
+                        <a:defRPr/>
+                      </a:pPr>
+                      <a:r>
+                        <a:rPr lang="en-US" altLang="ko-KR" dirty="0"/>
+                        <a:t>8</a:t>
+                      </a:r>
+                      <a:br>
+                        <a:rPr lang="en-US" altLang="ko-KR" dirty="0"/>
+                      </a:br>
+                      <a:r>
+                        <a:rPr lang="en-US" altLang="ko-KR" dirty="0"/>
+                        <a:t>(24~3)</a:t>
+                      </a:r>
+                      <a:endParaRPr lang="ko-KR" altLang="en-US" dirty="0"/>
+                    </a:p>
+                  </a:txBody>
+                  <a:tcPr anchor="ctr"/>
+                </a:tc>
+                <a:tc>
+                  <a:txBody>
+                    <a:bodyPr/>
+                    <a:lstStyle/>
+                    <a:p>
+                      <a:pPr marL="0" marR="0" lvl="0" indent="0" algn="ctr" defTabSz="914400" rtl="0" eaLnBrk="1" fontAlgn="auto" latinLnBrk="1" hangingPunct="1">
+                        <a:lnSpc>
+                          <a:spcPct val="100000"/>
+                        </a:lnSpc>
+                        <a:spcBef>
+                          <a:spcPts val="0"/>
+                        </a:spcBef>
+                        <a:spcAft>
+                          <a:spcPts val="0"/>
+                        </a:spcAft>
+                        <a:buClrTx/>
+                        <a:buSzTx/>
+                        <a:buFontTx/>
+                        <a:buNone/>
+                        <a:tabLst/>
+                        <a:defRPr/>
+                      </a:pPr>
+                      <a:r>
+                        <a:rPr lang="ko-KR" altLang="en-US" dirty="0"/>
+                        <a:t>비고</a:t>
+                      </a:r>
+                    </a:p>
+                  </a:txBody>
+                  <a:tcPr anchor="ctr"/>
+                </a:tc>
+                <a:extLst>
+                  <a:ext uri="{0D108BD9-81ED-4DB2-BD59-A6C34878D82A}">
+                    <a16:rowId xmlns:a16="http://schemas.microsoft.com/office/drawing/2014/main" val="74512545"/>
+                  </a:ext>
+                </a:extLst>
+              </a:tr>
+              <a:tr h="1204274">
+                <a:tc>
+                  <a:txBody>
+                    <a:bodyPr/>
+                    <a:lstStyle/>
+                    <a:p>
+                      <a:pPr algn="ctr" latinLnBrk="1"/>
+                      <a:r>
+                        <a:rPr lang="ko-KR" altLang="en-US" dirty="0" err="1"/>
+                        <a:t>백엔드</a:t>
+                      </a:r>
+                      <a:endParaRPr lang="ko-KR" altLang="en-US" dirty="0"/>
+                    </a:p>
+                  </a:txBody>
+                  <a:tcPr anchor="ctr"/>
+                </a:tc>
+                <a:tc>
+                  <a:txBody>
+                    <a:bodyPr/>
+                    <a:lstStyle/>
+                    <a:p>
+                      <a:pPr algn="ctr" latinLnBrk="1"/>
+                      <a:r>
+                        <a:rPr lang="ko-KR" altLang="en-US" dirty="0"/>
+                        <a:t>푸시</a:t>
+                      </a:r>
+                      <a:endParaRPr lang="en-US" altLang="ko-KR" dirty="0"/>
+                    </a:p>
+                    <a:p>
+                      <a:pPr algn="ctr" latinLnBrk="1"/>
+                      <a:r>
+                        <a:rPr lang="ko-KR" altLang="en-US" dirty="0"/>
+                        <a:t>약속</a:t>
+                      </a:r>
+                      <a:endParaRPr lang="en-US" altLang="ko-KR" dirty="0"/>
+                    </a:p>
+                    <a:p>
+                      <a:pPr algn="ctr" latinLnBrk="1"/>
+                      <a:r>
+                        <a:rPr lang="ko-KR" altLang="en-US" dirty="0" err="1"/>
+                        <a:t>인앱결제</a:t>
+                      </a:r>
+                      <a:endParaRPr lang="ko-KR" altLang="en-US" dirty="0"/>
+                    </a:p>
+                  </a:txBody>
+                  <a:tcPr anchor="ctr"/>
+                </a:tc>
+                <a:tc>
+                  <a:txBody>
+                    <a:bodyPr/>
+                    <a:lstStyle/>
+                    <a:p>
+                      <a:pPr algn="ctr" latinLnBrk="1"/>
+                      <a:r>
+                        <a:rPr lang="ko-KR" altLang="en-US" dirty="0"/>
+                        <a:t>푸시</a:t>
+                      </a:r>
+                      <a:r>
+                        <a:rPr lang="en-US" altLang="ko-KR" dirty="0"/>
+                        <a:t>-</a:t>
+                      </a:r>
+                      <a:r>
+                        <a:rPr lang="ko-KR" altLang="en-US" dirty="0"/>
+                        <a:t>심화</a:t>
+                      </a:r>
+                      <a:endParaRPr lang="en-US" altLang="ko-KR" dirty="0"/>
+                    </a:p>
+                    <a:p>
+                      <a:pPr algn="ctr" latinLnBrk="1"/>
+                      <a:r>
+                        <a:rPr lang="ko-KR" altLang="en-US" dirty="0"/>
+                        <a:t>프로필</a:t>
+                      </a:r>
+                    </a:p>
+                  </a:txBody>
+                  <a:tcPr anchor="ctr"/>
+                </a:tc>
+                <a:tc>
+                  <a:txBody>
+                    <a:bodyPr/>
+                    <a:lstStyle/>
+                    <a:p>
+                      <a:pPr algn="ctr" latinLnBrk="1"/>
+                      <a:endParaRPr lang="ko-KR" altLang="en-US"/>
+                    </a:p>
+                  </a:txBody>
+                  <a:tcPr anchor="ctr"/>
+                </a:tc>
+                <a:tc>
+                  <a:txBody>
+                    <a:bodyPr/>
+                    <a:lstStyle/>
+                    <a:p>
+                      <a:pPr algn="ctr" latinLnBrk="1"/>
+                      <a:endParaRPr lang="ko-KR" altLang="en-US"/>
+                    </a:p>
+                  </a:txBody>
+                  <a:tcPr anchor="ctr"/>
+                </a:tc>
+                <a:tc>
+                  <a:txBody>
+                    <a:bodyPr/>
+                    <a:lstStyle/>
+                    <a:p>
+                      <a:pPr algn="ctr" latinLnBrk="1"/>
+                      <a:endParaRPr lang="ko-KR" altLang="en-US"/>
+                    </a:p>
+                  </a:txBody>
+                  <a:tcPr anchor="ctr"/>
+                </a:tc>
+                <a:tc>
+                  <a:txBody>
+                    <a:bodyPr/>
+                    <a:lstStyle/>
+                    <a:p>
+                      <a:pPr algn="ctr" latinLnBrk="1"/>
+                      <a:endParaRPr lang="ko-KR" altLang="en-US"/>
+                    </a:p>
+                  </a:txBody>
+                  <a:tcPr anchor="ctr"/>
+                </a:tc>
+                <a:extLst>
+                  <a:ext uri="{0D108BD9-81ED-4DB2-BD59-A6C34878D82A}">
+                    <a16:rowId xmlns:a16="http://schemas.microsoft.com/office/drawing/2014/main" val="3105267698"/>
+                  </a:ext>
+                </a:extLst>
+              </a:tr>
+              <a:tr h="1204274">
+                <a:tc>
+                  <a:txBody>
+                    <a:bodyPr/>
+                    <a:lstStyle/>
+                    <a:p>
+                      <a:pPr algn="ctr" latinLnBrk="1"/>
+                      <a:r>
+                        <a:rPr lang="ko-KR" altLang="en-US" dirty="0"/>
+                        <a:t>프론트</a:t>
+                      </a:r>
+                    </a:p>
+                  </a:txBody>
+                  <a:tcPr anchor="ctr"/>
+                </a:tc>
+                <a:tc>
+                  <a:txBody>
+                    <a:bodyPr/>
+                    <a:lstStyle/>
+                    <a:p>
+                      <a:pPr algn="ctr" latinLnBrk="1"/>
+                      <a:r>
+                        <a:rPr lang="ko-KR" altLang="en-US" dirty="0"/>
+                        <a:t>푸시</a:t>
+                      </a:r>
+                      <a:endParaRPr lang="en-US" altLang="ko-KR" dirty="0"/>
+                    </a:p>
+                    <a:p>
+                      <a:pPr algn="ctr" latinLnBrk="1"/>
+                      <a:r>
+                        <a:rPr lang="ko-KR" altLang="en-US" dirty="0"/>
+                        <a:t>약속</a:t>
+                      </a:r>
+                      <a:endParaRPr lang="en-US" altLang="ko-KR" dirty="0"/>
+                    </a:p>
+                    <a:p>
+                      <a:pPr algn="ctr" latinLnBrk="1"/>
+                      <a:r>
+                        <a:rPr lang="ko-KR" altLang="en-US" dirty="0" err="1"/>
+                        <a:t>인앱결제</a:t>
+                      </a:r>
+                      <a:endParaRPr lang="ko-KR" altLang="en-US" dirty="0"/>
+                    </a:p>
+                  </a:txBody>
+                  <a:tcPr anchor="ctr"/>
+                </a:tc>
+                <a:tc>
+                  <a:txBody>
+                    <a:bodyPr/>
+                    <a:lstStyle/>
+                    <a:p>
+                      <a:pPr algn="ctr" latinLnBrk="1"/>
+                      <a:r>
+                        <a:rPr lang="ko-KR" altLang="en-US" dirty="0"/>
+                        <a:t>푸시</a:t>
+                      </a:r>
+                      <a:r>
+                        <a:rPr lang="en-US" altLang="ko-KR" dirty="0"/>
+                        <a:t>-</a:t>
+                      </a:r>
+                      <a:r>
+                        <a:rPr lang="ko-KR" altLang="en-US" dirty="0"/>
+                        <a:t>심화</a:t>
+                      </a:r>
+                      <a:endParaRPr lang="en-US" altLang="ko-KR" dirty="0"/>
+                    </a:p>
+                    <a:p>
+                      <a:pPr algn="ctr" latinLnBrk="1"/>
+                      <a:r>
+                        <a:rPr lang="ko-KR" altLang="en-US" dirty="0"/>
+                        <a:t>프로필</a:t>
+                      </a:r>
+                    </a:p>
+                  </a:txBody>
+                  <a:tcPr anchor="ctr"/>
+                </a:tc>
+                <a:tc>
+                  <a:txBody>
+                    <a:bodyPr/>
+                    <a:lstStyle/>
+                    <a:p>
+                      <a:pPr algn="ctr" latinLnBrk="1"/>
+                      <a:endParaRPr lang="ko-KR" altLang="en-US" dirty="0"/>
+                    </a:p>
+                  </a:txBody>
+                  <a:tcPr anchor="ctr"/>
+                </a:tc>
+                <a:tc>
+                  <a:txBody>
+                    <a:bodyPr/>
+                    <a:lstStyle/>
+                    <a:p>
+                      <a:pPr algn="ctr" latinLnBrk="1"/>
+                      <a:endParaRPr lang="ko-KR" altLang="en-US" dirty="0"/>
+                    </a:p>
+                  </a:txBody>
+                  <a:tcPr anchor="ctr"/>
+                </a:tc>
+                <a:tc>
+                  <a:txBody>
+                    <a:bodyPr/>
+                    <a:lstStyle/>
+                    <a:p>
+                      <a:pPr algn="ctr" latinLnBrk="1"/>
+                      <a:endParaRPr lang="ko-KR" altLang="en-US"/>
+                    </a:p>
+                  </a:txBody>
+                  <a:tcPr anchor="ctr"/>
+                </a:tc>
+                <a:tc>
+                  <a:txBody>
+                    <a:bodyPr/>
+                    <a:lstStyle/>
+                    <a:p>
+                      <a:pPr algn="ctr" latinLnBrk="1"/>
+                      <a:endParaRPr lang="ko-KR" altLang="en-US"/>
+                    </a:p>
+                  </a:txBody>
+                  <a:tcPr anchor="ctr"/>
+                </a:tc>
+                <a:extLst>
+                  <a:ext uri="{0D108BD9-81ED-4DB2-BD59-A6C34878D82A}">
+                    <a16:rowId xmlns:a16="http://schemas.microsoft.com/office/drawing/2014/main" val="3288371963"/>
+                  </a:ext>
+                </a:extLst>
+              </a:tr>
+              <a:tr h="1204274">
+                <a:tc>
+                  <a:txBody>
+                    <a:bodyPr/>
+                    <a:lstStyle/>
+                    <a:p>
+                      <a:pPr algn="ctr" latinLnBrk="1"/>
+                      <a:r>
+                        <a:rPr lang="ko-KR" altLang="en-US" dirty="0"/>
+                        <a:t>기능</a:t>
+                      </a:r>
+                      <a:endParaRPr lang="en-US" altLang="ko-KR" dirty="0"/>
+                    </a:p>
+                    <a:p>
+                      <a:pPr algn="ctr" latinLnBrk="1"/>
+                      <a:r>
+                        <a:rPr lang="ko-KR" altLang="en-US" dirty="0"/>
+                        <a:t>구현</a:t>
+                      </a:r>
+                    </a:p>
+                  </a:txBody>
+                  <a:tcPr anchor="ctr"/>
+                </a:tc>
+                <a:tc>
+                  <a:txBody>
+                    <a:bodyPr/>
+                    <a:lstStyle/>
+                    <a:p>
+                      <a:pPr algn="ctr" latinLnBrk="1"/>
+                      <a:r>
+                        <a:rPr lang="ko-KR" altLang="en-US" dirty="0"/>
+                        <a:t>수익화</a:t>
+                      </a:r>
+                      <a:endParaRPr lang="en-US" altLang="ko-KR" dirty="0"/>
+                    </a:p>
+                    <a:p>
+                      <a:pPr algn="ctr" latinLnBrk="1"/>
+                      <a:r>
+                        <a:rPr lang="ko-KR" altLang="en-US" dirty="0"/>
+                        <a:t>구현</a:t>
+                      </a:r>
+                      <a:endParaRPr lang="en-US" altLang="ko-KR" dirty="0"/>
+                    </a:p>
+                  </a:txBody>
+                  <a:tcPr anchor="ctr"/>
+                </a:tc>
+                <a:tc>
+                  <a:txBody>
+                    <a:bodyPr/>
+                    <a:lstStyle/>
+                    <a:p>
+                      <a:pPr algn="ctr" latinLnBrk="1"/>
+                      <a:r>
+                        <a:rPr lang="ko-KR" altLang="en-US" dirty="0"/>
+                        <a:t>수익화</a:t>
+                      </a:r>
+                      <a:endParaRPr lang="en-US" altLang="ko-KR" dirty="0"/>
+                    </a:p>
+                    <a:p>
+                      <a:pPr algn="ctr" latinLnBrk="1"/>
+                      <a:r>
+                        <a:rPr lang="ko-KR" altLang="en-US" dirty="0"/>
+                        <a:t>구현</a:t>
+                      </a:r>
+                    </a:p>
+                  </a:txBody>
+                  <a:tcPr anchor="ctr"/>
+                </a:tc>
+                <a:tc>
+                  <a:txBody>
+                    <a:bodyPr/>
+                    <a:lstStyle/>
+                    <a:p>
+                      <a:pPr algn="ctr" latinLnBrk="1"/>
+                      <a:r>
+                        <a:rPr lang="en-US" altLang="ko-KR" dirty="0"/>
+                        <a:t>1</a:t>
+                      </a:r>
+                      <a:r>
+                        <a:rPr lang="ko-KR" altLang="en-US" dirty="0"/>
+                        <a:t>차</a:t>
+                      </a:r>
+                      <a:endParaRPr lang="en-US" altLang="ko-KR" dirty="0"/>
+                    </a:p>
+                    <a:p>
+                      <a:pPr algn="ctr" latinLnBrk="1"/>
+                      <a:r>
+                        <a:rPr lang="ko-KR" altLang="en-US" dirty="0"/>
+                        <a:t>앱 검수</a:t>
+                      </a:r>
+                    </a:p>
+                  </a:txBody>
+                  <a:tcPr anchor="ctr"/>
+                </a:tc>
+                <a:tc>
+                  <a:txBody>
+                    <a:bodyPr/>
+                    <a:lstStyle/>
+                    <a:p>
+                      <a:pPr algn="ctr" latinLnBrk="1"/>
+                      <a:r>
+                        <a:rPr lang="en-US" altLang="ko-KR" dirty="0"/>
+                        <a:t>2</a:t>
+                      </a:r>
+                      <a:r>
+                        <a:rPr lang="ko-KR" altLang="en-US" dirty="0"/>
+                        <a:t>차</a:t>
+                      </a:r>
+                      <a:endParaRPr lang="en-US" altLang="ko-KR" dirty="0"/>
+                    </a:p>
+                    <a:p>
+                      <a:pPr algn="ctr" latinLnBrk="1"/>
+                      <a:r>
+                        <a:rPr lang="ko-KR" altLang="en-US" dirty="0"/>
+                        <a:t>앱 검수</a:t>
+                      </a:r>
+                    </a:p>
+                  </a:txBody>
+                  <a:tcPr anchor="ctr"/>
+                </a:tc>
+                <a:tc>
+                  <a:txBody>
+                    <a:bodyPr/>
+                    <a:lstStyle/>
+                    <a:p>
+                      <a:pPr algn="ctr" latinLnBrk="1"/>
+                      <a:r>
+                        <a:rPr lang="ko-KR" altLang="en-US" dirty="0"/>
+                        <a:t>수정</a:t>
+                      </a:r>
+                      <a:endParaRPr lang="en-US" altLang="ko-KR" dirty="0"/>
+                    </a:p>
+                    <a:p>
+                      <a:pPr algn="ctr" latinLnBrk="1"/>
+                      <a:r>
+                        <a:rPr lang="ko-KR" altLang="en-US" dirty="0"/>
+                        <a:t>보완</a:t>
+                      </a:r>
+                    </a:p>
+                  </a:txBody>
+                  <a:tcPr anchor="ctr"/>
+                </a:tc>
+                <a:tc>
+                  <a:txBody>
+                    <a:bodyPr/>
+                    <a:lstStyle/>
+                    <a:p>
+                      <a:pPr algn="ctr" latinLnBrk="1"/>
+                      <a:endParaRPr lang="ko-KR" altLang="en-US" dirty="0"/>
+                    </a:p>
+                  </a:txBody>
+                  <a:tcPr anchor="ctr"/>
+                </a:tc>
+                <a:extLst>
+                  <a:ext uri="{0D108BD9-81ED-4DB2-BD59-A6C34878D82A}">
+                    <a16:rowId xmlns:a16="http://schemas.microsoft.com/office/drawing/2014/main" val="4223625650"/>
+                  </a:ext>
+                </a:extLst>
+              </a:tr>
+              <a:tr h="1204274">
+                <a:tc>
+                  <a:txBody>
+                    <a:bodyPr/>
+                    <a:lstStyle/>
+                    <a:p>
+                      <a:pPr algn="ctr" latinLnBrk="1"/>
+                      <a:r>
+                        <a:rPr lang="ko-KR" altLang="en-US" dirty="0"/>
+                        <a:t>목표</a:t>
+                      </a:r>
+                    </a:p>
+                  </a:txBody>
+                  <a:tcPr anchor="ctr"/>
+                </a:tc>
+                <a:tc>
+                  <a:txBody>
+                    <a:bodyPr/>
+                    <a:lstStyle/>
+                    <a:p>
+                      <a:pPr algn="ctr" latinLnBrk="1"/>
+                      <a:r>
+                        <a:rPr lang="ko-KR" altLang="en-US" dirty="0"/>
+                        <a:t>홍보용</a:t>
+                      </a:r>
+                      <a:br>
+                        <a:rPr lang="en-US" altLang="ko-KR" dirty="0"/>
+                      </a:br>
+                      <a:r>
+                        <a:rPr lang="en-US" altLang="ko-KR" dirty="0"/>
+                        <a:t>PPT</a:t>
+                      </a:r>
+                    </a:p>
+                    <a:p>
+                      <a:pPr algn="ctr" latinLnBrk="1"/>
+                      <a:r>
+                        <a:rPr lang="ko-KR" altLang="en-US" dirty="0"/>
+                        <a:t>제작</a:t>
+                      </a:r>
+                    </a:p>
+                  </a:txBody>
+                  <a:tcPr anchor="ctr"/>
+                </a:tc>
+                <a:tc>
+                  <a:txBody>
+                    <a:bodyPr/>
+                    <a:lstStyle/>
+                    <a:p>
+                      <a:pPr algn="ctr" latinLnBrk="1"/>
+                      <a:r>
+                        <a:rPr lang="ko-KR" altLang="en-US" dirty="0"/>
+                        <a:t>홍보용</a:t>
+                      </a:r>
+                      <a:br>
+                        <a:rPr lang="en-US" altLang="ko-KR" dirty="0"/>
+                      </a:br>
+                      <a:r>
+                        <a:rPr lang="en-US" altLang="ko-KR" dirty="0"/>
+                        <a:t>PPT</a:t>
+                      </a:r>
+                    </a:p>
+                    <a:p>
+                      <a:pPr algn="ctr" latinLnBrk="1"/>
+                      <a:r>
+                        <a:rPr lang="ko-KR" altLang="en-US" dirty="0"/>
+                        <a:t>제작</a:t>
+                      </a:r>
+                    </a:p>
+                  </a:txBody>
+                  <a:tcPr anchor="ctr"/>
+                </a:tc>
+                <a:tc>
+                  <a:txBody>
+                    <a:bodyPr/>
+                    <a:lstStyle/>
+                    <a:p>
+                      <a:pPr algn="ctr" latinLnBrk="1"/>
+                      <a:r>
+                        <a:rPr lang="ko-KR" altLang="en-US" dirty="0"/>
+                        <a:t>홍보용</a:t>
+                      </a:r>
+                      <a:br>
+                        <a:rPr lang="en-US" altLang="ko-KR" dirty="0"/>
+                      </a:br>
+                      <a:r>
+                        <a:rPr lang="ko-KR" altLang="en-US" dirty="0"/>
+                        <a:t>영상</a:t>
+                      </a:r>
+                      <a:endParaRPr lang="en-US" altLang="ko-KR" dirty="0"/>
+                    </a:p>
+                    <a:p>
+                      <a:pPr algn="ctr" latinLnBrk="1"/>
+                      <a:r>
+                        <a:rPr lang="ko-KR" altLang="en-US" dirty="0"/>
+                        <a:t>제작</a:t>
+                      </a:r>
+                    </a:p>
+                  </a:txBody>
+                  <a:tcPr anchor="ctr"/>
+                </a:tc>
+                <a:tc>
+                  <a:txBody>
+                    <a:bodyPr/>
+                    <a:lstStyle/>
+                    <a:p>
+                      <a:pPr algn="ctr" latinLnBrk="1"/>
+                      <a:r>
+                        <a:rPr lang="ko-KR" altLang="en-US" dirty="0"/>
+                        <a:t>홍보용</a:t>
+                      </a:r>
+                      <a:endParaRPr lang="en-US" altLang="ko-KR" dirty="0"/>
+                    </a:p>
+                    <a:p>
+                      <a:pPr algn="ctr" latinLnBrk="1"/>
+                      <a:r>
+                        <a:rPr lang="ko-KR" altLang="en-US" dirty="0"/>
+                        <a:t>영상</a:t>
+                      </a:r>
+                      <a:endParaRPr lang="en-US" altLang="ko-KR" dirty="0"/>
+                    </a:p>
+                    <a:p>
+                      <a:pPr algn="ctr" latinLnBrk="1"/>
+                      <a:r>
+                        <a:rPr lang="ko-KR" altLang="en-US" dirty="0"/>
+                        <a:t>제작</a:t>
+                      </a:r>
+                    </a:p>
+                  </a:txBody>
+                  <a:tcPr anchor="ctr"/>
+                </a:tc>
+                <a:tc>
+                  <a:txBody>
+                    <a:bodyPr/>
+                    <a:lstStyle/>
+                    <a:p>
+                      <a:pPr algn="ctr" latinLnBrk="1"/>
+                      <a:endParaRPr lang="ko-KR" altLang="en-US" dirty="0"/>
+                    </a:p>
+                  </a:txBody>
+                  <a:tcPr anchor="ctr"/>
+                </a:tc>
+                <a:tc>
+                  <a:txBody>
+                    <a:bodyPr/>
+                    <a:lstStyle/>
+                    <a:p>
+                      <a:pPr algn="ctr" latinLnBrk="1"/>
+                      <a:endParaRPr lang="ko-KR" altLang="en-US" dirty="0"/>
+                    </a:p>
+                  </a:txBody>
+                  <a:tcPr anchor="ctr"/>
+                </a:tc>
+                <a:extLst>
+                  <a:ext uri="{0D108BD9-81ED-4DB2-BD59-A6C34878D82A}">
+                    <a16:rowId xmlns:a16="http://schemas.microsoft.com/office/drawing/2014/main" val="415513090"/>
+                  </a:ext>
+                </a:extLst>
+              </a:tr>
+            </a:tbl>
+          </a:graphicData>
+        </a:graphic>
+      </p:graphicFrame>
+      <p:sp>
+        <p:nvSpPr>
+          <p:cNvPr id="2" name="직사각형 1">
+            <a:extLst>
+              <a:ext uri="{FF2B5EF4-FFF2-40B4-BE49-F238E27FC236}">
+                <a16:creationId xmlns:a16="http://schemas.microsoft.com/office/drawing/2014/main" id="{5040979C-B3AB-B699-B48D-EF6B2DEAB5DE}"/>
+              </a:ext>
+            </a:extLst>
+          </p:cNvPr>
+          <p:cNvSpPr/>
+          <p:nvPr/>
+        </p:nvSpPr>
+        <p:spPr>
+          <a:xfrm>
+            <a:off x="0" y="427107"/>
+            <a:ext cx="3657600" cy="1181885"/>
+          </a:xfrm>
+          <a:prstGeom prst="rect">
+            <a:avLst/>
+          </a:prstGeom>
+          <a:ln>
+            <a:noFill/>
+          </a:ln>
+        </p:spPr>
+        <p:style>
+          <a:lnRef idx="1">
+            <a:schemeClr val="accent6"/>
+          </a:lnRef>
+          <a:fillRef idx="2">
+            <a:schemeClr val="accent6"/>
+          </a:fillRef>
+          <a:effectRef idx="1">
+            <a:schemeClr val="accent6"/>
+          </a:effectRef>
+          <a:fontRef idx="minor">
+            <a:schemeClr val="dk1"/>
+          </a:fontRef>
+        </p:style>
+        <p:txBody>
+          <a:bodyPr rtlCol="0" anchor="ctr"/>
+          <a:lstStyle/>
+          <a:p>
+            <a:pPr algn="ctr"/>
+            <a:r>
+              <a:rPr lang="en-US" altLang="ko-KR" sz="4800" b="1" dirty="0"/>
+              <a:t>To-dos</a:t>
+            </a:r>
+            <a:endParaRPr lang="ko-KR" altLang="en-US" sz="4800" b="1" dirty="0"/>
+          </a:p>
+        </p:txBody>
+      </p:sp>
+      <p:sp>
+        <p:nvSpPr>
+          <p:cNvPr id="3" name="직사각형 2">
+            <a:extLst>
+              <a:ext uri="{FF2B5EF4-FFF2-40B4-BE49-F238E27FC236}">
+                <a16:creationId xmlns:a16="http://schemas.microsoft.com/office/drawing/2014/main" id="{83918764-3B7E-F92F-3034-781F42B0E7F5}"/>
+              </a:ext>
+            </a:extLst>
+          </p:cNvPr>
+          <p:cNvSpPr/>
+          <p:nvPr/>
+        </p:nvSpPr>
+        <p:spPr>
+          <a:xfrm>
+            <a:off x="0" y="1643378"/>
+            <a:ext cx="3657600" cy="4787515"/>
+          </a:xfrm>
+          <a:prstGeom prst="rect">
+            <a:avLst/>
+          </a:prstGeom>
+          <a:ln>
+            <a:noFill/>
+          </a:ln>
+        </p:spPr>
+        <p:style>
+          <a:lnRef idx="1">
+            <a:schemeClr val="accent6"/>
+          </a:lnRef>
+          <a:fillRef idx="2">
+            <a:schemeClr val="accent6"/>
+          </a:fillRef>
+          <a:effectRef idx="1">
+            <a:schemeClr val="accent6"/>
+          </a:effectRef>
+          <a:fontRef idx="minor">
+            <a:schemeClr val="dk1"/>
+          </a:fontRef>
+        </p:style>
+        <p:txBody>
+          <a:bodyPr rtlCol="0" anchor="ctr"/>
+          <a:lstStyle/>
+          <a:p>
+            <a:pPr marL="285750" indent="-285750">
+              <a:buFontTx/>
+              <a:buChar char="-"/>
+            </a:pPr>
+            <a:r>
+              <a:rPr lang="ko-KR" altLang="en-US" dirty="0"/>
+              <a:t>의사측 프로필 이미지 업로드</a:t>
+            </a:r>
+            <a:br>
+              <a:rPr lang="en-US" altLang="ko-KR" dirty="0"/>
+            </a:br>
+            <a:r>
+              <a:rPr lang="ko-KR" altLang="en-US" dirty="0"/>
+              <a:t>구현</a:t>
+            </a:r>
+            <a:endParaRPr lang="en-US" altLang="ko-KR" dirty="0"/>
+          </a:p>
+          <a:p>
+            <a:pPr marL="285750" indent="-285750">
+              <a:buFontTx/>
+              <a:buChar char="-"/>
+            </a:pPr>
+            <a:r>
+              <a:rPr lang="ko-KR" altLang="en-US" dirty="0"/>
+              <a:t>푸시 알림 </a:t>
+            </a:r>
+            <a:r>
+              <a:rPr lang="ko-KR" altLang="en-US" dirty="0" err="1"/>
+              <a:t>탭하면</a:t>
+            </a:r>
+            <a:r>
+              <a:rPr lang="ko-KR" altLang="en-US" dirty="0"/>
+              <a:t> 바로 해당</a:t>
+            </a:r>
+            <a:br>
+              <a:rPr lang="en-US" altLang="ko-KR" dirty="0"/>
+            </a:br>
+            <a:r>
+              <a:rPr lang="ko-KR" altLang="en-US" dirty="0"/>
+              <a:t>메뉴로 이동하는 기능 구현</a:t>
+            </a:r>
+            <a:endParaRPr lang="en-US" altLang="ko-KR" dirty="0"/>
+          </a:p>
+          <a:p>
+            <a:pPr marL="285750" indent="-285750">
+              <a:buFontTx/>
+              <a:buChar char="-"/>
+            </a:pPr>
+            <a:r>
+              <a:rPr lang="ko-KR" altLang="en-US" dirty="0"/>
+              <a:t>약속 잡기 메커니즘 구현</a:t>
+            </a:r>
+            <a:br>
+              <a:rPr lang="en-US" altLang="ko-KR" dirty="0"/>
+            </a:br>
+            <a:r>
+              <a:rPr lang="en-US" altLang="ko-KR" dirty="0"/>
+              <a:t>(</a:t>
+            </a:r>
+            <a:r>
+              <a:rPr lang="ko-KR" altLang="en-US" dirty="0"/>
+              <a:t>프론트</a:t>
+            </a:r>
+            <a:r>
+              <a:rPr lang="en-US" altLang="ko-KR" dirty="0"/>
+              <a:t>)</a:t>
+            </a:r>
+          </a:p>
+          <a:p>
+            <a:pPr marL="285750" indent="-285750">
+              <a:buFontTx/>
+              <a:buChar char="-"/>
+            </a:pPr>
+            <a:r>
+              <a:rPr lang="ko-KR" altLang="en-US" dirty="0" err="1"/>
+              <a:t>인앱결제</a:t>
+            </a:r>
+            <a:r>
+              <a:rPr lang="ko-KR" altLang="en-US" dirty="0"/>
+              <a:t> 시스템 구현</a:t>
+            </a:r>
+            <a:endParaRPr lang="en-US" altLang="ko-KR" dirty="0"/>
+          </a:p>
+          <a:p>
+            <a:pPr marL="285750" indent="-285750">
+              <a:buFontTx/>
+              <a:buChar char="-"/>
+            </a:pPr>
+            <a:r>
+              <a:rPr lang="ko-KR" altLang="en-US" dirty="0"/>
+              <a:t>의료인용 앱 회원가입 기능</a:t>
+            </a:r>
+            <a:br>
+              <a:rPr lang="en-US" altLang="ko-KR" dirty="0"/>
+            </a:br>
+            <a:r>
+              <a:rPr lang="ko-KR" altLang="en-US" dirty="0"/>
+              <a:t>구현</a:t>
+            </a:r>
+            <a:endParaRPr lang="en-US" altLang="ko-KR" dirty="0"/>
+          </a:p>
+          <a:p>
+            <a:pPr marL="285750" indent="-285750">
+              <a:buFontTx/>
+              <a:buChar char="-"/>
+            </a:pPr>
+            <a:r>
+              <a:rPr lang="ko-KR" altLang="en-US" dirty="0"/>
+              <a:t>의료인용 앱 전반적인</a:t>
+            </a:r>
+            <a:br>
+              <a:rPr lang="en-US" altLang="ko-KR" dirty="0"/>
+            </a:br>
+            <a:r>
+              <a:rPr lang="ko-KR" altLang="en-US" dirty="0" err="1"/>
+              <a:t>리팩터링</a:t>
+            </a:r>
+            <a:endParaRPr lang="ko-KR" altLang="en-US" dirty="0"/>
+          </a:p>
+        </p:txBody>
+      </p:sp>
+    </p:spTree>
+    <p:extLst>
+      <p:ext uri="{BB962C8B-B14F-4D97-AF65-F5344CB8AC3E}">
+        <p14:creationId xmlns:p14="http://schemas.microsoft.com/office/powerpoint/2010/main" val="2849441042"/>
+      </p:ext>
+    </p:extLst>
+  </p:cSld>
+  <p:clrMapOvr>
+    <a:masterClrMapping/>
+  </p:clrMapOvr>
+</p:sld>
+</file>
+
+<file path=ppt/slides/slide3.xml><?xml version="1.0" encoding="utf-8"?>
+<p:sld xmlns:a="http://schemas.openxmlformats.org/drawingml/2006/main" xmlns:r="http://schemas.openxmlformats.org/officeDocument/2006/relationships" xmlns:p="http://schemas.openxmlformats.org/presentationml/2006/main">
+  <p:cSld>
+    <p:spTree>
+      <p:nvGrpSpPr>
+        <p:cNvPr id="1" name=""/>
+        <p:cNvGrpSpPr/>
+        <p:nvPr/>
+      </p:nvGrpSpPr>
+      <p:grpSpPr>
+        <a:xfrm>
+          <a:off x="0" y="0"/>
+          <a:ext cx="0" cy="0"/>
+          <a:chOff x="0" y="0"/>
+          <a:chExt cx="0" cy="0"/>
+        </a:xfrm>
+      </p:grpSpPr>
+      <p:sp>
+        <p:nvSpPr>
+          <p:cNvPr id="2" name="제목 1">
+            <a:extLst>
+              <a:ext uri="{FF2B5EF4-FFF2-40B4-BE49-F238E27FC236}">
+                <a16:creationId xmlns:a16="http://schemas.microsoft.com/office/drawing/2014/main" id="{A38FA873-E91C-36CD-AD86-C004A3EE5A0B}"/>
+              </a:ext>
+            </a:extLst>
+          </p:cNvPr>
+          <p:cNvSpPr>
+            <a:spLocks noGrp="1"/>
+          </p:cNvSpPr>
+          <p:nvPr>
+            <p:ph type="title"/>
+          </p:nvPr>
+        </p:nvSpPr>
+        <p:spPr/>
+        <p:txBody>
+          <a:bodyPr/>
+          <a:lstStyle/>
+          <a:p>
+            <a:r>
+              <a:rPr lang="ko-KR" altLang="en-US" dirty="0"/>
+              <a:t>프로젝트 로드맵</a:t>
+            </a:r>
+          </a:p>
+        </p:txBody>
+      </p:sp>
+      <p:sp>
+        <p:nvSpPr>
+          <p:cNvPr id="3" name="내용 개체 틀 2">
+            <a:extLst>
+              <a:ext uri="{FF2B5EF4-FFF2-40B4-BE49-F238E27FC236}">
+                <a16:creationId xmlns:a16="http://schemas.microsoft.com/office/drawing/2014/main" id="{7556FF14-6C4A-2D9D-696C-DAACBCC826F6}"/>
+              </a:ext>
+            </a:extLst>
+          </p:cNvPr>
+          <p:cNvSpPr>
+            <a:spLocks noGrp="1"/>
+          </p:cNvSpPr>
+          <p:nvPr>
+            <p:ph idx="1"/>
+          </p:nvPr>
+        </p:nvSpPr>
+        <p:spPr/>
+        <p:txBody>
+          <a:bodyPr/>
+          <a:lstStyle/>
+          <a:p>
+            <a:r>
+              <a:rPr lang="en-US" altLang="ko-KR" dirty="0"/>
+              <a:t>4</a:t>
+            </a:r>
+            <a:r>
+              <a:rPr lang="ko-KR" altLang="en-US" dirty="0"/>
+              <a:t>주차 </a:t>
+            </a:r>
+            <a:r>
+              <a:rPr lang="en-US" altLang="ko-KR" dirty="0"/>
+              <a:t>(1/27 ~ 2/2)</a:t>
+            </a:r>
+          </a:p>
+          <a:p>
+            <a:pPr lvl="1"/>
+            <a:r>
+              <a:rPr lang="ko-KR" altLang="en-US" dirty="0"/>
+              <a:t>반응형 </a:t>
+            </a:r>
+            <a:r>
+              <a:rPr lang="en-US" altLang="ko-KR" dirty="0"/>
+              <a:t>Push notification system </a:t>
+            </a:r>
+            <a:r>
+              <a:rPr lang="ko-KR" altLang="en-US" dirty="0"/>
+              <a:t>구현</a:t>
+            </a:r>
+            <a:endParaRPr lang="en-US" altLang="ko-KR" dirty="0"/>
+          </a:p>
+          <a:p>
+            <a:pPr lvl="1"/>
+            <a:r>
+              <a:rPr lang="ko-KR" altLang="en-US" dirty="0"/>
+              <a:t>약속 잡기 </a:t>
+            </a:r>
+            <a:r>
+              <a:rPr lang="en-US" altLang="ko-KR" dirty="0"/>
+              <a:t>Mechanism </a:t>
+            </a:r>
+            <a:r>
+              <a:rPr lang="ko-KR" altLang="en-US" dirty="0"/>
+              <a:t>구현</a:t>
+            </a:r>
+            <a:endParaRPr lang="en-US" altLang="ko-KR" dirty="0"/>
+          </a:p>
+          <a:p>
+            <a:pPr lvl="1"/>
+            <a:r>
+              <a:rPr lang="ko-KR" altLang="en-US" dirty="0" err="1"/>
+              <a:t>인앱결제</a:t>
+            </a:r>
+            <a:r>
+              <a:rPr lang="ko-KR" altLang="en-US" dirty="0"/>
+              <a:t> 사전조사</a:t>
+            </a:r>
+            <a:endParaRPr lang="en-US" altLang="ko-KR" dirty="0"/>
+          </a:p>
+          <a:p>
+            <a:pPr lvl="2"/>
+            <a:r>
+              <a:rPr lang="ko-KR" altLang="en-US" dirty="0" err="1"/>
+              <a:t>프론트엔드</a:t>
+            </a:r>
+            <a:r>
+              <a:rPr lang="ko-KR" altLang="en-US" dirty="0"/>
+              <a:t> 파트</a:t>
+            </a:r>
+            <a:r>
+              <a:rPr lang="en-US" altLang="ko-KR" dirty="0"/>
+              <a:t>: API </a:t>
+            </a:r>
+            <a:r>
+              <a:rPr lang="ko-KR" altLang="en-US" dirty="0"/>
+              <a:t>활용</a:t>
+            </a:r>
+            <a:endParaRPr lang="en-US" altLang="ko-KR" dirty="0"/>
+          </a:p>
+          <a:p>
+            <a:pPr lvl="2"/>
+            <a:r>
+              <a:rPr lang="ko-KR" altLang="en-US" dirty="0" err="1"/>
+              <a:t>백엔드</a:t>
+            </a:r>
+            <a:r>
+              <a:rPr lang="ko-KR" altLang="en-US" dirty="0"/>
+              <a:t> 파트</a:t>
+            </a:r>
+            <a:r>
+              <a:rPr lang="en-US" altLang="ko-KR" dirty="0"/>
+              <a:t>: </a:t>
+            </a:r>
+            <a:r>
+              <a:rPr lang="ko-KR" altLang="en-US" dirty="0"/>
+              <a:t>인증 </a:t>
+            </a:r>
+            <a:r>
+              <a:rPr lang="en-US" altLang="ko-KR" dirty="0"/>
+              <a:t>Mechanism</a:t>
+            </a:r>
+          </a:p>
+          <a:p>
+            <a:pPr lvl="1"/>
+            <a:r>
+              <a:rPr lang="en-US" altLang="ko-KR" dirty="0"/>
+              <a:t>(</a:t>
+            </a:r>
+            <a:r>
+              <a:rPr lang="ko-KR" altLang="en-US" dirty="0" err="1"/>
+              <a:t>백엔드</a:t>
+            </a:r>
+            <a:r>
+              <a:rPr lang="en-US" altLang="ko-KR" dirty="0"/>
+              <a:t>) </a:t>
+            </a:r>
+            <a:r>
+              <a:rPr lang="en-US" altLang="ko-KR" dirty="0" err="1"/>
+              <a:t>kafka</a:t>
+            </a:r>
+            <a:r>
+              <a:rPr lang="ko-KR" altLang="en-US" dirty="0"/>
+              <a:t>를 활용한 </a:t>
+            </a:r>
+            <a:r>
+              <a:rPr lang="ko-KR" altLang="en-US" dirty="0" err="1"/>
+              <a:t>스케일러블</a:t>
+            </a:r>
+            <a:r>
+              <a:rPr lang="ko-KR" altLang="en-US" dirty="0"/>
+              <a:t> 채팅 시스템 구현</a:t>
+            </a:r>
+            <a:endParaRPr lang="en-US" altLang="ko-KR" dirty="0"/>
+          </a:p>
+          <a:p>
+            <a:pPr lvl="1"/>
+            <a:r>
+              <a:rPr lang="en-US" altLang="ko-KR" dirty="0"/>
+              <a:t>(</a:t>
+            </a:r>
+            <a:r>
+              <a:rPr lang="ko-KR" altLang="en-US" dirty="0" err="1"/>
+              <a:t>백엔드</a:t>
+            </a:r>
+            <a:r>
+              <a:rPr lang="en-US" altLang="ko-KR" dirty="0"/>
+              <a:t>) docker </a:t>
+            </a:r>
+            <a:r>
+              <a:rPr lang="ko-KR" altLang="en-US" dirty="0"/>
+              <a:t>및 </a:t>
+            </a:r>
+            <a:r>
+              <a:rPr lang="en-US" altLang="ko-KR" dirty="0"/>
+              <a:t>Google Cloud Run</a:t>
+            </a:r>
+            <a:r>
+              <a:rPr lang="ko-KR" altLang="en-US" dirty="0"/>
+              <a:t>을 활용한 </a:t>
+            </a:r>
+            <a:r>
+              <a:rPr lang="ko-KR" altLang="en-US" dirty="0" err="1"/>
+              <a:t>스케일러블</a:t>
+            </a:r>
+            <a:r>
+              <a:rPr lang="ko-KR" altLang="en-US" dirty="0"/>
+              <a:t> 서버화</a:t>
+            </a:r>
+            <a:endParaRPr lang="en-US" altLang="ko-KR" dirty="0"/>
+          </a:p>
+          <a:p>
+            <a:pPr lvl="1"/>
+            <a:endParaRPr lang="ko-KR" altLang="en-US" dirty="0"/>
+          </a:p>
+        </p:txBody>
+      </p:sp>
+    </p:spTree>
+    <p:extLst>
+      <p:ext uri="{BB962C8B-B14F-4D97-AF65-F5344CB8AC3E}">
+        <p14:creationId xmlns:p14="http://schemas.microsoft.com/office/powerpoint/2010/main" val="535207036"/>
+      </p:ext>
+    </p:extLst>
+  </p:cSld>
+  <p:clrMapOvr>
+    <a:masterClrMapping/>
+  </p:clrMapOvr>
+</p:sld>
+</file>
+
+<file path=ppt/slides/slide4.xml><?xml version="1.0" encoding="utf-8"?>
+<p:sld xmlns:a="http://schemas.openxmlformats.org/drawingml/2006/main" xmlns:r="http://schemas.openxmlformats.org/officeDocument/2006/relationships" xmlns:p="http://schemas.openxmlformats.org/presentationml/2006/main">
+  <p:cSld>
+    <p:spTree>
+      <p:nvGrpSpPr>
+        <p:cNvPr id="1" name="">
+          <a:extLst>
+            <a:ext uri="{FF2B5EF4-FFF2-40B4-BE49-F238E27FC236}">
+              <a16:creationId xmlns:a16="http://schemas.microsoft.com/office/drawing/2014/main" id="{A1B3F274-54F9-55DC-86C0-CC6D9AB26D2A}"/>
+            </a:ext>
+          </a:extLst>
+        </p:cNvPr>
+        <p:cNvGrpSpPr/>
+        <p:nvPr/>
+      </p:nvGrpSpPr>
+      <p:grpSpPr>
+        <a:xfrm>
+          <a:off x="0" y="0"/>
+          <a:ext cx="0" cy="0"/>
+          <a:chOff x="0" y="0"/>
+          <a:chExt cx="0" cy="0"/>
+        </a:xfrm>
+      </p:grpSpPr>
+      <p:sp>
+        <p:nvSpPr>
+          <p:cNvPr id="2" name="제목 1">
+            <a:extLst>
+              <a:ext uri="{FF2B5EF4-FFF2-40B4-BE49-F238E27FC236}">
+                <a16:creationId xmlns:a16="http://schemas.microsoft.com/office/drawing/2014/main" id="{ACD092CD-1B2C-0390-D628-889D0B008947}"/>
+              </a:ext>
+            </a:extLst>
+          </p:cNvPr>
+          <p:cNvSpPr>
+            <a:spLocks noGrp="1"/>
+          </p:cNvSpPr>
+          <p:nvPr>
+            <p:ph type="title"/>
+          </p:nvPr>
+        </p:nvSpPr>
+        <p:spPr/>
+        <p:txBody>
+          <a:bodyPr/>
+          <a:lstStyle/>
+          <a:p>
+            <a:r>
+              <a:rPr lang="ko-KR" altLang="en-US" dirty="0"/>
+              <a:t>프로젝트 로드맵</a:t>
+            </a:r>
+          </a:p>
+        </p:txBody>
+      </p:sp>
+      <p:sp>
+        <p:nvSpPr>
+          <p:cNvPr id="3" name="내용 개체 틀 2">
+            <a:extLst>
+              <a:ext uri="{FF2B5EF4-FFF2-40B4-BE49-F238E27FC236}">
+                <a16:creationId xmlns:a16="http://schemas.microsoft.com/office/drawing/2014/main" id="{3F78BF24-C127-8F13-2687-20E39DF46AD1}"/>
+              </a:ext>
+            </a:extLst>
+          </p:cNvPr>
+          <p:cNvSpPr>
+            <a:spLocks noGrp="1"/>
+          </p:cNvSpPr>
+          <p:nvPr>
+            <p:ph idx="1"/>
+          </p:nvPr>
+        </p:nvSpPr>
+        <p:spPr/>
+        <p:txBody>
+          <a:bodyPr/>
+          <a:lstStyle/>
+          <a:p>
+            <a:r>
+              <a:rPr lang="en-US" altLang="ko-KR" dirty="0"/>
+              <a:t>4</a:t>
+            </a:r>
+            <a:r>
+              <a:rPr lang="ko-KR" altLang="en-US" dirty="0"/>
+              <a:t>주차 </a:t>
+            </a:r>
+            <a:r>
+              <a:rPr lang="en-US" altLang="ko-KR" dirty="0"/>
+              <a:t>(1/27 ~ 2/2)</a:t>
+            </a:r>
+          </a:p>
+          <a:p>
+            <a:pPr lvl="1"/>
+            <a:r>
+              <a:rPr lang="ko-KR" altLang="en-US" dirty="0"/>
+              <a:t>반응형 </a:t>
+            </a:r>
+            <a:r>
+              <a:rPr lang="en-US" altLang="ko-KR" dirty="0"/>
+              <a:t>Push notification system </a:t>
+            </a:r>
+            <a:r>
+              <a:rPr lang="ko-KR" altLang="en-US" dirty="0"/>
+              <a:t>구현</a:t>
+            </a:r>
+            <a:endParaRPr lang="en-US" altLang="ko-KR" dirty="0"/>
+          </a:p>
+          <a:p>
+            <a:pPr lvl="1"/>
+            <a:r>
+              <a:rPr lang="ko-KR" altLang="en-US" dirty="0"/>
+              <a:t>약속 잡기 </a:t>
+            </a:r>
+            <a:r>
+              <a:rPr lang="en-US" altLang="ko-KR" dirty="0"/>
+              <a:t>Mechanism </a:t>
+            </a:r>
+            <a:r>
+              <a:rPr lang="ko-KR" altLang="en-US" dirty="0"/>
+              <a:t>구현</a:t>
+            </a:r>
+            <a:endParaRPr lang="en-US" altLang="ko-KR" dirty="0"/>
+          </a:p>
+          <a:p>
+            <a:pPr lvl="1"/>
+            <a:r>
+              <a:rPr lang="ko-KR" altLang="en-US" dirty="0" err="1"/>
+              <a:t>인앱결제</a:t>
+            </a:r>
+            <a:r>
+              <a:rPr lang="ko-KR" altLang="en-US" dirty="0"/>
+              <a:t> 사전조사</a:t>
+            </a:r>
+            <a:endParaRPr lang="en-US" altLang="ko-KR" dirty="0"/>
+          </a:p>
+          <a:p>
+            <a:pPr lvl="2"/>
+            <a:r>
+              <a:rPr lang="ko-KR" altLang="en-US" dirty="0" err="1"/>
+              <a:t>프론트엔드</a:t>
+            </a:r>
+            <a:r>
+              <a:rPr lang="ko-KR" altLang="en-US" dirty="0"/>
+              <a:t> 파트</a:t>
+            </a:r>
+            <a:r>
+              <a:rPr lang="en-US" altLang="ko-KR" dirty="0"/>
+              <a:t>: API </a:t>
+            </a:r>
+            <a:r>
+              <a:rPr lang="ko-KR" altLang="en-US" dirty="0"/>
+              <a:t>활용</a:t>
+            </a:r>
+            <a:endParaRPr lang="en-US" altLang="ko-KR" dirty="0"/>
+          </a:p>
+          <a:p>
+            <a:pPr lvl="2"/>
+            <a:r>
+              <a:rPr lang="ko-KR" altLang="en-US" dirty="0" err="1"/>
+              <a:t>백엔드</a:t>
+            </a:r>
+            <a:r>
+              <a:rPr lang="ko-KR" altLang="en-US" dirty="0"/>
+              <a:t> 파트</a:t>
+            </a:r>
+            <a:r>
+              <a:rPr lang="en-US" altLang="ko-KR" dirty="0"/>
+              <a:t>: </a:t>
+            </a:r>
+            <a:r>
+              <a:rPr lang="ko-KR" altLang="en-US" dirty="0"/>
+              <a:t>인증 </a:t>
+            </a:r>
+            <a:r>
+              <a:rPr lang="en-US" altLang="ko-KR" dirty="0"/>
+              <a:t>Mechanism</a:t>
+            </a:r>
+          </a:p>
+          <a:p>
+            <a:pPr lvl="1"/>
+            <a:r>
+              <a:rPr lang="en-US" altLang="ko-KR" dirty="0"/>
+              <a:t>(</a:t>
+            </a:r>
+            <a:r>
+              <a:rPr lang="ko-KR" altLang="en-US" dirty="0" err="1"/>
+              <a:t>백엔드</a:t>
+            </a:r>
+            <a:r>
+              <a:rPr lang="en-US" altLang="ko-KR" dirty="0"/>
+              <a:t>) </a:t>
+            </a:r>
+            <a:r>
+              <a:rPr lang="en-US" altLang="ko-KR" dirty="0" err="1"/>
+              <a:t>kafka</a:t>
+            </a:r>
+            <a:r>
+              <a:rPr lang="ko-KR" altLang="en-US" dirty="0"/>
+              <a:t>를 활용한 </a:t>
+            </a:r>
+            <a:r>
+              <a:rPr lang="ko-KR" altLang="en-US" dirty="0" err="1"/>
+              <a:t>스케일러블</a:t>
+            </a:r>
+            <a:r>
+              <a:rPr lang="ko-KR" altLang="en-US" dirty="0"/>
+              <a:t> 채팅 시스템 구현</a:t>
+            </a:r>
+            <a:endParaRPr lang="en-US" altLang="ko-KR" dirty="0"/>
+          </a:p>
+          <a:p>
+            <a:pPr lvl="1"/>
+            <a:r>
+              <a:rPr lang="en-US" altLang="ko-KR" dirty="0"/>
+              <a:t>(</a:t>
+            </a:r>
+            <a:r>
+              <a:rPr lang="ko-KR" altLang="en-US" dirty="0" err="1"/>
+              <a:t>백엔드</a:t>
+            </a:r>
+            <a:r>
+              <a:rPr lang="en-US" altLang="ko-KR" dirty="0"/>
+              <a:t>) docker </a:t>
+            </a:r>
+            <a:r>
+              <a:rPr lang="ko-KR" altLang="en-US" dirty="0"/>
+              <a:t>및 </a:t>
+            </a:r>
+            <a:r>
+              <a:rPr lang="en-US" altLang="ko-KR" dirty="0"/>
+              <a:t>Google Cloud Run</a:t>
+            </a:r>
+            <a:r>
+              <a:rPr lang="ko-KR" altLang="en-US" dirty="0"/>
+              <a:t>을 활용한 </a:t>
+            </a:r>
+            <a:r>
+              <a:rPr lang="ko-KR" altLang="en-US" dirty="0" err="1"/>
+              <a:t>스케일러블</a:t>
+            </a:r>
+            <a:r>
+              <a:rPr lang="ko-KR" altLang="en-US" dirty="0"/>
+              <a:t> 서버화</a:t>
+            </a:r>
+            <a:endParaRPr lang="en-US" altLang="ko-KR" dirty="0"/>
+          </a:p>
+          <a:p>
+            <a:pPr lvl="1"/>
+            <a:endParaRPr lang="ko-KR" altLang="en-US" dirty="0"/>
+          </a:p>
+        </p:txBody>
+      </p:sp>
+    </p:spTree>
+    <p:extLst>
+      <p:ext uri="{BB962C8B-B14F-4D97-AF65-F5344CB8AC3E}">
+        <p14:creationId xmlns:p14="http://schemas.microsoft.com/office/powerpoint/2010/main" val="1309725049"/>
+      </p:ext>
+    </p:extLst>
+  </p:cSld>
+  <p:clrMapOvr>
+    <a:masterClrMapping/>
+  </p:clrMapOvr>
+</p:sld>
+</file>
+
 <file path=ppt/theme/theme1.xml><?xml version="1.0" encoding="utf-8"?>
 <a:theme xmlns:a="http://schemas.openxmlformats.org/drawingml/2006/main" name="Office 테마">
   <a:themeElements>

</xml_diff>

<commit_message>
0.9.9: implemented doctor profile image upload feature
</commit_message>
<xml_diff>
--- a/roadmap.pptx
+++ b/roadmap.pptx
@@ -262,7 +262,7 @@
           <a:p>
             <a:fld id="{90745D86-D533-4367-BAD3-8E674D1E8289}" type="datetimeFigureOut">
               <a:rPr lang="ko-KR" altLang="en-US" smtClean="0"/>
-              <a:t>2025-01-27</a:t>
+              <a:t>2025-02-02</a:t>
             </a:fld>
             <a:endParaRPr lang="ko-KR" altLang="en-US"/>
           </a:p>
@@ -460,7 +460,7 @@
           <a:p>
             <a:fld id="{90745D86-D533-4367-BAD3-8E674D1E8289}" type="datetimeFigureOut">
               <a:rPr lang="ko-KR" altLang="en-US" smtClean="0"/>
-              <a:t>2025-01-27</a:t>
+              <a:t>2025-02-02</a:t>
             </a:fld>
             <a:endParaRPr lang="ko-KR" altLang="en-US"/>
           </a:p>
@@ -668,7 +668,7 @@
           <a:p>
             <a:fld id="{90745D86-D533-4367-BAD3-8E674D1E8289}" type="datetimeFigureOut">
               <a:rPr lang="ko-KR" altLang="en-US" smtClean="0"/>
-              <a:t>2025-01-27</a:t>
+              <a:t>2025-02-02</a:t>
             </a:fld>
             <a:endParaRPr lang="ko-KR" altLang="en-US"/>
           </a:p>
@@ -866,7 +866,7 @@
           <a:p>
             <a:fld id="{90745D86-D533-4367-BAD3-8E674D1E8289}" type="datetimeFigureOut">
               <a:rPr lang="ko-KR" altLang="en-US" smtClean="0"/>
-              <a:t>2025-01-27</a:t>
+              <a:t>2025-02-02</a:t>
             </a:fld>
             <a:endParaRPr lang="ko-KR" altLang="en-US"/>
           </a:p>
@@ -1141,7 +1141,7 @@
           <a:p>
             <a:fld id="{90745D86-D533-4367-BAD3-8E674D1E8289}" type="datetimeFigureOut">
               <a:rPr lang="ko-KR" altLang="en-US" smtClean="0"/>
-              <a:t>2025-01-27</a:t>
+              <a:t>2025-02-02</a:t>
             </a:fld>
             <a:endParaRPr lang="ko-KR" altLang="en-US"/>
           </a:p>
@@ -1406,7 +1406,7 @@
           <a:p>
             <a:fld id="{90745D86-D533-4367-BAD3-8E674D1E8289}" type="datetimeFigureOut">
               <a:rPr lang="ko-KR" altLang="en-US" smtClean="0"/>
-              <a:t>2025-01-27</a:t>
+              <a:t>2025-02-02</a:t>
             </a:fld>
             <a:endParaRPr lang="ko-KR" altLang="en-US"/>
           </a:p>
@@ -1818,7 +1818,7 @@
           <a:p>
             <a:fld id="{90745D86-D533-4367-BAD3-8E674D1E8289}" type="datetimeFigureOut">
               <a:rPr lang="ko-KR" altLang="en-US" smtClean="0"/>
-              <a:t>2025-01-27</a:t>
+              <a:t>2025-02-02</a:t>
             </a:fld>
             <a:endParaRPr lang="ko-KR" altLang="en-US"/>
           </a:p>
@@ -1959,7 +1959,7 @@
           <a:p>
             <a:fld id="{90745D86-D533-4367-BAD3-8E674D1E8289}" type="datetimeFigureOut">
               <a:rPr lang="ko-KR" altLang="en-US" smtClean="0"/>
-              <a:t>2025-01-27</a:t>
+              <a:t>2025-02-02</a:t>
             </a:fld>
             <a:endParaRPr lang="ko-KR" altLang="en-US"/>
           </a:p>
@@ -2072,7 +2072,7 @@
           <a:p>
             <a:fld id="{90745D86-D533-4367-BAD3-8E674D1E8289}" type="datetimeFigureOut">
               <a:rPr lang="ko-KR" altLang="en-US" smtClean="0"/>
-              <a:t>2025-01-27</a:t>
+              <a:t>2025-02-02</a:t>
             </a:fld>
             <a:endParaRPr lang="ko-KR" altLang="en-US"/>
           </a:p>
@@ -2383,7 +2383,7 @@
           <a:p>
             <a:fld id="{90745D86-D533-4367-BAD3-8E674D1E8289}" type="datetimeFigureOut">
               <a:rPr lang="ko-KR" altLang="en-US" smtClean="0"/>
-              <a:t>2025-01-27</a:t>
+              <a:t>2025-02-02</a:t>
             </a:fld>
             <a:endParaRPr lang="ko-KR" altLang="en-US"/>
           </a:p>
@@ -2671,7 +2671,7 @@
           <a:p>
             <a:fld id="{90745D86-D533-4367-BAD3-8E674D1E8289}" type="datetimeFigureOut">
               <a:rPr lang="ko-KR" altLang="en-US" smtClean="0"/>
-              <a:t>2025-01-27</a:t>
+              <a:t>2025-02-02</a:t>
             </a:fld>
             <a:endParaRPr lang="ko-KR" altLang="en-US"/>
           </a:p>
@@ -2912,7 +2912,7 @@
           <a:p>
             <a:fld id="{90745D86-D533-4367-BAD3-8E674D1E8289}" type="datetimeFigureOut">
               <a:rPr lang="ko-KR" altLang="en-US" smtClean="0"/>
-              <a:t>2025-01-27</a:t>
+              <a:t>2025-02-02</a:t>
             </a:fld>
             <a:endParaRPr lang="ko-KR" altLang="en-US"/>
           </a:p>
@@ -6080,7 +6080,7 @@
           <a:p>
             <a:r>
               <a:rPr lang="en-US" altLang="ko-KR" dirty="0"/>
-              <a:t>4</a:t>
+              <a:t>5</a:t>
             </a:r>
             <a:r>
               <a:rPr lang="ko-KR" altLang="en-US" dirty="0"/>
@@ -6088,7 +6088,7 @@
             </a:r>
             <a:r>
               <a:rPr lang="en-US" altLang="ko-KR" dirty="0"/>
-              <a:t>(1/27 ~ 2/2)</a:t>
+              <a:t>(2/3 ~ 2/9)</a:t>
             </a:r>
           </a:p>
           <a:p>
@@ -6119,94 +6119,95 @@
             </a:r>
             <a:r>
               <a:rPr lang="ko-KR" altLang="en-US" dirty="0"/>
-              <a:t>구현</a:t>
+              <a:t>구현 계속</a:t>
             </a:r>
             <a:endParaRPr lang="en-US" altLang="ko-KR" dirty="0"/>
           </a:p>
           <a:p>
             <a:pPr lvl="1"/>
             <a:r>
+              <a:rPr lang="ko-KR" altLang="en-US" dirty="0"/>
+              <a:t>병원 리뷰 기능 구현</a:t>
+            </a:r>
+            <a:endParaRPr lang="en-US" altLang="ko-KR" dirty="0"/>
+          </a:p>
+          <a:p>
+            <a:pPr lvl="1"/>
+            <a:r>
               <a:rPr lang="ko-KR" altLang="en-US" dirty="0" err="1"/>
-              <a:t>인앱결제</a:t>
+              <a:t>약속별</a:t>
             </a:r>
             <a:r>
               <a:rPr lang="ko-KR" altLang="en-US" dirty="0"/>
-              <a:t> 사전조사</a:t>
+              <a:t> 평가 기능 구현</a:t>
             </a:r>
             <a:endParaRPr lang="en-US" altLang="ko-KR" dirty="0"/>
           </a:p>
           <a:p>
-            <a:pPr lvl="2"/>
+            <a:pPr lvl="1"/>
+            <a:r>
+              <a:rPr lang="ko-KR" altLang="en-US" dirty="0"/>
+              <a:t>의사 프로필 업로드 기능 구현</a:t>
+            </a:r>
+            <a:endParaRPr lang="en-US" altLang="ko-KR" dirty="0"/>
+          </a:p>
+          <a:p>
+            <a:pPr lvl="1"/>
+            <a:r>
+              <a:rPr lang="ko-KR" altLang="en-US" dirty="0"/>
+              <a:t>의사 </a:t>
+            </a:r>
+            <a:r>
+              <a:rPr lang="en-US" altLang="ko-KR" dirty="0"/>
+              <a:t>&lt;-&gt; </a:t>
+            </a:r>
+            <a:r>
+              <a:rPr lang="ko-KR" altLang="en-US" dirty="0"/>
+              <a:t>병원 등록 시스템 구현</a:t>
+            </a:r>
+            <a:endParaRPr lang="en-US" altLang="ko-KR" dirty="0"/>
+          </a:p>
+          <a:p>
+            <a:pPr lvl="1"/>
+            <a:r>
+              <a:rPr lang="ko-KR" altLang="en-US" dirty="0"/>
+              <a:t>병원 프로필 업로드 기능 구현</a:t>
+            </a:r>
+            <a:endParaRPr lang="en-US" altLang="ko-KR" dirty="0"/>
+          </a:p>
+          <a:p>
+            <a:pPr lvl="1"/>
+            <a:r>
+              <a:rPr lang="en-US" altLang="ko-KR" dirty="0"/>
+              <a:t>(</a:t>
+            </a:r>
             <a:r>
               <a:rPr lang="ko-KR" altLang="en-US" dirty="0" err="1"/>
               <a:t>프론트엔드</a:t>
             </a:r>
             <a:r>
-              <a:rPr lang="ko-KR" altLang="en-US" dirty="0"/>
-              <a:t> 파트</a:t>
-            </a:r>
-            <a:r>
-              <a:rPr lang="en-US" altLang="ko-KR" dirty="0"/>
-              <a:t>: API </a:t>
-            </a:r>
-            <a:r>
-              <a:rPr lang="ko-KR" altLang="en-US" dirty="0"/>
-              <a:t>활용</a:t>
-            </a:r>
-            <a:endParaRPr lang="en-US" altLang="ko-KR" dirty="0"/>
-          </a:p>
-          <a:p>
-            <a:pPr lvl="2"/>
-            <a:r>
-              <a:rPr lang="ko-KR" altLang="en-US" dirty="0" err="1"/>
-              <a:t>백엔드</a:t>
-            </a:r>
-            <a:r>
-              <a:rPr lang="ko-KR" altLang="en-US" dirty="0"/>
-              <a:t> 파트</a:t>
-            </a:r>
-            <a:r>
-              <a:rPr lang="en-US" altLang="ko-KR" dirty="0"/>
-              <a:t>: </a:t>
-            </a:r>
-            <a:r>
-              <a:rPr lang="ko-KR" altLang="en-US" dirty="0"/>
-              <a:t>인증 </a:t>
-            </a:r>
-            <a:r>
-              <a:rPr lang="en-US" altLang="ko-KR" dirty="0"/>
-              <a:t>Mechanism</a:t>
-            </a:r>
-          </a:p>
-          <a:p>
-            <a:pPr lvl="1"/>
-            <a:r>
-              <a:rPr lang="en-US" altLang="ko-KR" dirty="0"/>
-              <a:t>(</a:t>
-            </a:r>
-            <a:r>
-              <a:rPr lang="ko-KR" altLang="en-US" dirty="0" err="1"/>
-              <a:t>백엔드</a:t>
-            </a:r>
-            <a:r>
               <a:rPr lang="en-US" altLang="ko-KR" dirty="0"/>
               <a:t>) </a:t>
             </a:r>
             <a:r>
-              <a:rPr lang="en-US" altLang="ko-KR" dirty="0" err="1"/>
-              <a:t>kafka</a:t>
-            </a:r>
-            <a:r>
               <a:rPr lang="ko-KR" altLang="en-US" dirty="0"/>
-              <a:t>를 활용한 </a:t>
-            </a:r>
-            <a:r>
-              <a:rPr lang="ko-KR" altLang="en-US" dirty="0" err="1"/>
-              <a:t>스케일러블</a:t>
+              <a:t>일일 </a:t>
+            </a:r>
+            <a:r>
+              <a:rPr lang="en-US" altLang="ko-KR" dirty="0"/>
+              <a:t>Limit </a:t>
             </a:r>
             <a:r>
               <a:rPr lang="ko-KR" altLang="en-US" dirty="0"/>
-              <a:t> 채팅 시스템 구현</a:t>
+              <a:t>부 </a:t>
+            </a:r>
+            <a:r>
+              <a:rPr lang="en-US" altLang="ko-KR" dirty="0"/>
+              <a:t>UX </a:t>
+            </a:r>
+            <a:r>
+              <a:rPr lang="ko-KR" altLang="en-US" dirty="0"/>
+              <a:t>다듬기</a:t>
             </a:r>
             <a:endParaRPr lang="en-US" altLang="ko-KR" dirty="0"/>
           </a:p>

</xml_diff>

<commit_message>
0.9.9: redesigned patient memo feature
</commit_message>
<xml_diff>
--- a/roadmap.pptx
+++ b/roadmap.pptx
@@ -9,6 +9,7 @@
     <p:sldId id="258" r:id="rId3"/>
     <p:sldId id="259" r:id="rId4"/>
     <p:sldId id="260" r:id="rId5"/>
+    <p:sldId id="261" r:id="rId6"/>
   </p:sldIdLst>
   <p:sldSz cx="12192000" cy="6858000"/>
   <p:notesSz cx="6858000" cy="9144000"/>
@@ -262,7 +263,7 @@
           <a:p>
             <a:fld id="{90745D86-D533-4367-BAD3-8E674D1E8289}" type="datetimeFigureOut">
               <a:rPr lang="ko-KR" altLang="en-US" smtClean="0"/>
-              <a:t>2025-02-02</a:t>
+              <a:t>2025-02-11</a:t>
             </a:fld>
             <a:endParaRPr lang="ko-KR" altLang="en-US"/>
           </a:p>
@@ -460,7 +461,7 @@
           <a:p>
             <a:fld id="{90745D86-D533-4367-BAD3-8E674D1E8289}" type="datetimeFigureOut">
               <a:rPr lang="ko-KR" altLang="en-US" smtClean="0"/>
-              <a:t>2025-02-02</a:t>
+              <a:t>2025-02-11</a:t>
             </a:fld>
             <a:endParaRPr lang="ko-KR" altLang="en-US"/>
           </a:p>
@@ -668,7 +669,7 @@
           <a:p>
             <a:fld id="{90745D86-D533-4367-BAD3-8E674D1E8289}" type="datetimeFigureOut">
               <a:rPr lang="ko-KR" altLang="en-US" smtClean="0"/>
-              <a:t>2025-02-02</a:t>
+              <a:t>2025-02-11</a:t>
             </a:fld>
             <a:endParaRPr lang="ko-KR" altLang="en-US"/>
           </a:p>
@@ -866,7 +867,7 @@
           <a:p>
             <a:fld id="{90745D86-D533-4367-BAD3-8E674D1E8289}" type="datetimeFigureOut">
               <a:rPr lang="ko-KR" altLang="en-US" smtClean="0"/>
-              <a:t>2025-02-02</a:t>
+              <a:t>2025-02-11</a:t>
             </a:fld>
             <a:endParaRPr lang="ko-KR" altLang="en-US"/>
           </a:p>
@@ -1141,7 +1142,7 @@
           <a:p>
             <a:fld id="{90745D86-D533-4367-BAD3-8E674D1E8289}" type="datetimeFigureOut">
               <a:rPr lang="ko-KR" altLang="en-US" smtClean="0"/>
-              <a:t>2025-02-02</a:t>
+              <a:t>2025-02-11</a:t>
             </a:fld>
             <a:endParaRPr lang="ko-KR" altLang="en-US"/>
           </a:p>
@@ -1406,7 +1407,7 @@
           <a:p>
             <a:fld id="{90745D86-D533-4367-BAD3-8E674D1E8289}" type="datetimeFigureOut">
               <a:rPr lang="ko-KR" altLang="en-US" smtClean="0"/>
-              <a:t>2025-02-02</a:t>
+              <a:t>2025-02-11</a:t>
             </a:fld>
             <a:endParaRPr lang="ko-KR" altLang="en-US"/>
           </a:p>
@@ -1818,7 +1819,7 @@
           <a:p>
             <a:fld id="{90745D86-D533-4367-BAD3-8E674D1E8289}" type="datetimeFigureOut">
               <a:rPr lang="ko-KR" altLang="en-US" smtClean="0"/>
-              <a:t>2025-02-02</a:t>
+              <a:t>2025-02-11</a:t>
             </a:fld>
             <a:endParaRPr lang="ko-KR" altLang="en-US"/>
           </a:p>
@@ -1959,7 +1960,7 @@
           <a:p>
             <a:fld id="{90745D86-D533-4367-BAD3-8E674D1E8289}" type="datetimeFigureOut">
               <a:rPr lang="ko-KR" altLang="en-US" smtClean="0"/>
-              <a:t>2025-02-02</a:t>
+              <a:t>2025-02-11</a:t>
             </a:fld>
             <a:endParaRPr lang="ko-KR" altLang="en-US"/>
           </a:p>
@@ -2072,7 +2073,7 @@
           <a:p>
             <a:fld id="{90745D86-D533-4367-BAD3-8E674D1E8289}" type="datetimeFigureOut">
               <a:rPr lang="ko-KR" altLang="en-US" smtClean="0"/>
-              <a:t>2025-02-02</a:t>
+              <a:t>2025-02-11</a:t>
             </a:fld>
             <a:endParaRPr lang="ko-KR" altLang="en-US"/>
           </a:p>
@@ -2383,7 +2384,7 @@
           <a:p>
             <a:fld id="{90745D86-D533-4367-BAD3-8E674D1E8289}" type="datetimeFigureOut">
               <a:rPr lang="ko-KR" altLang="en-US" smtClean="0"/>
-              <a:t>2025-02-02</a:t>
+              <a:t>2025-02-11</a:t>
             </a:fld>
             <a:endParaRPr lang="ko-KR" altLang="en-US"/>
           </a:p>
@@ -2671,7 +2672,7 @@
           <a:p>
             <a:fld id="{90745D86-D533-4367-BAD3-8E674D1E8289}" type="datetimeFigureOut">
               <a:rPr lang="ko-KR" altLang="en-US" smtClean="0"/>
-              <a:t>2025-02-02</a:t>
+              <a:t>2025-02-11</a:t>
             </a:fld>
             <a:endParaRPr lang="ko-KR" altLang="en-US"/>
           </a:p>
@@ -2912,7 +2913,7 @@
           <a:p>
             <a:fld id="{90745D86-D533-4367-BAD3-8E674D1E8289}" type="datetimeFigureOut">
               <a:rPr lang="ko-KR" altLang="en-US" smtClean="0"/>
-              <a:t>2025-02-02</a:t>
+              <a:t>2025-02-11</a:t>
             </a:fld>
             <a:endParaRPr lang="ko-KR" altLang="en-US"/>
           </a:p>
@@ -6266,6 +6267,278 @@
 </p:sld>
 </file>
 
+<file path=ppt/slides/slide5.xml><?xml version="1.0" encoding="utf-8"?>
+<p:sld xmlns:a="http://schemas.openxmlformats.org/drawingml/2006/main" xmlns:r="http://schemas.openxmlformats.org/officeDocument/2006/relationships" xmlns:p="http://schemas.openxmlformats.org/presentationml/2006/main">
+  <p:cSld>
+    <p:spTree>
+      <p:nvGrpSpPr>
+        <p:cNvPr id="1" name="">
+          <a:extLst>
+            <a:ext uri="{FF2B5EF4-FFF2-40B4-BE49-F238E27FC236}">
+              <a16:creationId xmlns:a16="http://schemas.microsoft.com/office/drawing/2014/main" id="{DE60754D-4047-821E-7D50-F19ED3E32E9C}"/>
+            </a:ext>
+          </a:extLst>
+        </p:cNvPr>
+        <p:cNvGrpSpPr/>
+        <p:nvPr/>
+      </p:nvGrpSpPr>
+      <p:grpSpPr>
+        <a:xfrm>
+          <a:off x="0" y="0"/>
+          <a:ext cx="0" cy="0"/>
+          <a:chOff x="0" y="0"/>
+          <a:chExt cx="0" cy="0"/>
+        </a:xfrm>
+      </p:grpSpPr>
+      <p:sp>
+        <p:nvSpPr>
+          <p:cNvPr id="2" name="제목 1">
+            <a:extLst>
+              <a:ext uri="{FF2B5EF4-FFF2-40B4-BE49-F238E27FC236}">
+                <a16:creationId xmlns:a16="http://schemas.microsoft.com/office/drawing/2014/main" id="{AEDF98E0-A85A-8769-7CA8-759665A857E7}"/>
+              </a:ext>
+            </a:extLst>
+          </p:cNvPr>
+          <p:cNvSpPr>
+            <a:spLocks noGrp="1"/>
+          </p:cNvSpPr>
+          <p:nvPr>
+            <p:ph type="title"/>
+          </p:nvPr>
+        </p:nvSpPr>
+        <p:spPr/>
+        <p:txBody>
+          <a:bodyPr/>
+          <a:lstStyle/>
+          <a:p>
+            <a:r>
+              <a:rPr lang="ko-KR" altLang="en-US" dirty="0"/>
+              <a:t>프로젝트 로드맵</a:t>
+            </a:r>
+          </a:p>
+        </p:txBody>
+      </p:sp>
+      <p:sp>
+        <p:nvSpPr>
+          <p:cNvPr id="3" name="내용 개체 틀 2">
+            <a:extLst>
+              <a:ext uri="{FF2B5EF4-FFF2-40B4-BE49-F238E27FC236}">
+                <a16:creationId xmlns:a16="http://schemas.microsoft.com/office/drawing/2014/main" id="{50FDF479-F56A-D68E-BA1B-A6DBCCF30259}"/>
+              </a:ext>
+            </a:extLst>
+          </p:cNvPr>
+          <p:cNvSpPr>
+            <a:spLocks noGrp="1"/>
+          </p:cNvSpPr>
+          <p:nvPr>
+            <p:ph idx="1"/>
+          </p:nvPr>
+        </p:nvSpPr>
+        <p:spPr/>
+        <p:txBody>
+          <a:bodyPr/>
+          <a:lstStyle/>
+          <a:p>
+            <a:r>
+              <a:rPr lang="en-US" altLang="ko-KR" dirty="0"/>
+              <a:t>6</a:t>
+            </a:r>
+            <a:r>
+              <a:rPr lang="ko-KR" altLang="en-US" dirty="0"/>
+              <a:t>주차 </a:t>
+            </a:r>
+            <a:r>
+              <a:rPr lang="en-US" altLang="ko-KR" dirty="0"/>
+              <a:t>(2/10 ~ 2/16)</a:t>
+            </a:r>
+          </a:p>
+          <a:p>
+            <a:pPr lvl="1"/>
+            <a:r>
+              <a:rPr lang="ko-KR" altLang="en-US" dirty="0"/>
+              <a:t>반응형 </a:t>
+            </a:r>
+            <a:r>
+              <a:rPr lang="en-US" altLang="ko-KR" dirty="0"/>
+              <a:t>Push notification system </a:t>
+            </a:r>
+            <a:r>
+              <a:rPr lang="ko-KR" altLang="en-US" dirty="0"/>
+              <a:t>구현</a:t>
+            </a:r>
+            <a:endParaRPr lang="en-US" altLang="ko-KR" dirty="0"/>
+          </a:p>
+          <a:p>
+            <a:pPr lvl="1"/>
+            <a:r>
+              <a:rPr lang="ko-KR" altLang="en-US" dirty="0"/>
+              <a:t>약속 잡기 </a:t>
+            </a:r>
+            <a:r>
+              <a:rPr lang="en-US" altLang="ko-KR" dirty="0"/>
+              <a:t>Mechanism </a:t>
+            </a:r>
+            <a:r>
+              <a:rPr lang="ko-KR" altLang="en-US" dirty="0"/>
+              <a:t>구현 계속</a:t>
+            </a:r>
+            <a:endParaRPr lang="en-US" altLang="ko-KR" dirty="0"/>
+          </a:p>
+          <a:p>
+            <a:pPr lvl="1"/>
+            <a:r>
+              <a:rPr lang="ko-KR" altLang="en-US" dirty="0"/>
+              <a:t>병원 리뷰 기능 구현</a:t>
+            </a:r>
+            <a:endParaRPr lang="en-US" altLang="ko-KR" dirty="0"/>
+          </a:p>
+          <a:p>
+            <a:pPr lvl="1"/>
+            <a:r>
+              <a:rPr lang="ko-KR" altLang="en-US" dirty="0" err="1"/>
+              <a:t>약속별</a:t>
+            </a:r>
+            <a:r>
+              <a:rPr lang="ko-KR" altLang="en-US" dirty="0"/>
+              <a:t> 평가 기능 구현</a:t>
+            </a:r>
+            <a:endParaRPr lang="en-US" altLang="ko-KR" dirty="0"/>
+          </a:p>
+          <a:p>
+            <a:pPr lvl="1"/>
+            <a:r>
+              <a:rPr lang="en-US" altLang="ko-KR" dirty="0"/>
+              <a:t>(</a:t>
+            </a:r>
+            <a:r>
+              <a:rPr lang="ko-KR" altLang="en-US" dirty="0" err="1"/>
+              <a:t>프론트엔드</a:t>
+            </a:r>
+            <a:r>
+              <a:rPr lang="en-US" altLang="ko-KR" dirty="0"/>
+              <a:t>) </a:t>
+            </a:r>
+            <a:r>
+              <a:rPr lang="ko-KR" altLang="en-US" dirty="0"/>
+              <a:t>일일 </a:t>
+            </a:r>
+            <a:r>
+              <a:rPr lang="en-US" altLang="ko-KR" dirty="0"/>
+              <a:t>Limit </a:t>
+            </a:r>
+            <a:r>
+              <a:rPr lang="ko-KR" altLang="en-US" dirty="0"/>
+              <a:t>부 </a:t>
+            </a:r>
+            <a:r>
+              <a:rPr lang="en-US" altLang="ko-KR" dirty="0"/>
+              <a:t>UX </a:t>
+            </a:r>
+            <a:r>
+              <a:rPr lang="ko-KR" altLang="en-US" dirty="0"/>
+              <a:t>다듬기</a:t>
+            </a:r>
+            <a:endParaRPr lang="en-US" altLang="ko-KR" dirty="0"/>
+          </a:p>
+          <a:p>
+            <a:pPr lvl="1"/>
+            <a:r>
+              <a:rPr lang="ko-KR" altLang="en-US" dirty="0"/>
+              <a:t>환자 메모 기능 구현</a:t>
+            </a:r>
+            <a:endParaRPr lang="en-US" altLang="ko-KR" dirty="0"/>
+          </a:p>
+          <a:p>
+            <a:pPr lvl="1"/>
+            <a:r>
+              <a:rPr lang="ko-KR" altLang="en-US" dirty="0"/>
+              <a:t>치료사용 앱 </a:t>
+            </a:r>
+            <a:r>
+              <a:rPr lang="en-US" altLang="ko-KR" dirty="0"/>
+              <a:t>– </a:t>
+            </a:r>
+            <a:r>
+              <a:rPr lang="ko-KR" altLang="en-US" dirty="0"/>
+              <a:t>일일 </a:t>
+            </a:r>
+            <a:r>
+              <a:rPr lang="en-US" altLang="ko-KR" dirty="0"/>
+              <a:t>AI </a:t>
+            </a:r>
+            <a:r>
+              <a:rPr lang="ko-KR" altLang="en-US" dirty="0"/>
+              <a:t>요약 기능 구현</a:t>
+            </a:r>
+            <a:endParaRPr lang="en-US" altLang="ko-KR" dirty="0"/>
+          </a:p>
+          <a:p>
+            <a:pPr lvl="1"/>
+            <a:r>
+              <a:rPr lang="ko-KR" altLang="en-US" dirty="0"/>
+              <a:t>치료사용 앱 </a:t>
+            </a:r>
+            <a:r>
+              <a:rPr lang="en-US" altLang="ko-KR" dirty="0"/>
+              <a:t>– </a:t>
+            </a:r>
+            <a:r>
+              <a:rPr lang="ko-KR" altLang="en-US" dirty="0" err="1"/>
+              <a:t>환자별</a:t>
+            </a:r>
+            <a:r>
+              <a:rPr lang="ko-KR" altLang="en-US" dirty="0"/>
+              <a:t> 메모 </a:t>
+            </a:r>
+            <a:r>
+              <a:rPr lang="en-US" altLang="ko-KR" dirty="0"/>
+              <a:t>AI </a:t>
+            </a:r>
+            <a:r>
+              <a:rPr lang="ko-KR" altLang="en-US" dirty="0"/>
+              <a:t>요약 기능 구현</a:t>
+            </a:r>
+            <a:endParaRPr lang="en-US" altLang="ko-KR" dirty="0"/>
+          </a:p>
+          <a:p>
+            <a:pPr lvl="1"/>
+            <a:r>
+              <a:rPr lang="en-US" altLang="ko-KR" dirty="0"/>
+              <a:t>(</a:t>
+            </a:r>
+            <a:r>
+              <a:rPr lang="ko-KR" altLang="en-US" dirty="0" err="1"/>
+              <a:t>백엔드</a:t>
+            </a:r>
+            <a:r>
+              <a:rPr lang="en-US" altLang="ko-KR" dirty="0"/>
+              <a:t>) </a:t>
+            </a:r>
+            <a:r>
+              <a:rPr lang="ko-KR" altLang="en-US" dirty="0"/>
+              <a:t>채팅서버 </a:t>
+            </a:r>
+            <a:r>
+              <a:rPr lang="en-US" altLang="ko-KR" dirty="0" err="1"/>
+              <a:t>Dockerizing</a:t>
+            </a:r>
+            <a:endParaRPr lang="en-US" altLang="ko-KR" dirty="0"/>
+          </a:p>
+        </p:txBody>
+      </p:sp>
+    </p:spTree>
+    <p:extLst>
+      <p:ext uri="{BB962C8B-B14F-4D97-AF65-F5344CB8AC3E}">
+        <p14:creationId xmlns:p14="http://schemas.microsoft.com/office/powerpoint/2010/main" val="2585805494"/>
+      </p:ext>
+    </p:extLst>
+  </p:cSld>
+  <p:clrMapOvr>
+    <a:masterClrMapping/>
+  </p:clrMapOvr>
+</p:sld>
+</file>
+
 <file path=ppt/theme/theme1.xml><?xml version="1.0" encoding="utf-8"?>
 <a:theme xmlns:a="http://schemas.openxmlformats.org/drawingml/2006/main" name="Office 테마">
   <a:themeElements>

</xml_diff>